<commit_message>
Refactor cisco/devops/ci-cd-automation delivery artifacts to EO Framework standards
- Created EO-compliant closeout-presentation.md (10 slides, proper YAML frontmatter)
- Created project-plan.csv with 4 sections (Timeline, Milestones, RACI, Communications)
- Created configuration.csv with 48 CI/CD automation parameters
- Created test-plan.csv with 38 tests (14 functional, 14 non-functional, 10 UAT)
- Updated detailed-design.md with required sections and YAML metadata
- Updated implementation-guide.md with Infrastructure Deployment phases
- All 6 delivery documents generated successfully
</commit_message>
<xml_diff>
--- a/solutions/cisco/devops/ci-cd-automation/delivery/closeout-presentation.pptx
+++ b/solutions/cisco/devops/ci-cd-automation/delivery/closeout-presentation.pptx
@@ -17,16 +17,6 @@
     <p:sldId id="262" r:id="rId2"/>
     <p:sldId id="263" r:id="rId14"/>
     <p:sldId id="264" r:id="rId15"/>
-    <p:sldId id="265" r:id="rId16"/>
-    <p:sldId id="266" r:id="rId17"/>
-    <p:sldId id="267" r:id="rId18"/>
-    <p:sldId id="268" r:id="rId19"/>
-    <p:sldId id="269" r:id="rId20"/>
-    <p:sldId id="270" r:id="rId21"/>
-    <p:sldId id="271" r:id="rId22"/>
-    <p:sldId id="272" r:id="rId23"/>
-    <p:sldId id="273" r:id="rId24"/>
-    <p:sldId id="274" r:id="rId25"/>
   </p:sldIdLst>
   <p:sldSz cx="9144000" cy="5143500" type="screen16x9"/>
   <p:notesSz cx="5143500" cy="9144000"/>
@@ -126,6 +116,9 @@
     <p:ext uri="{EFAFB233-063F-42B5-8137-9DF3F51BA10A}">
       <p15:sldGuideLst xmlns:p15="http://schemas.microsoft.com/office/powerpoint/2012/main"/>
     </p:ext>
+    <p:ext uri="{2D200454-40CA-4A62-9FC3-DE9A4176ACB9}">
+      <p15:notesGuideLst xmlns:p15="http://schemas.microsoft.com/office/powerpoint/2012/main"/>
+    </p:ext>
   </p:extLst>
 </p:presentation>
 </file>
@@ -152,6 +145,59 @@
           <a:chExt cx="0" cy="0"/>
         </a:xfrm>
       </p:grpSpPr>
+      <p:sp>
+        <p:nvSpPr>
+          <p:cNvPr id="2" name="Slide Image Placeholder 1"/>
+          <p:cNvSpPr>
+            <a:spLocks noGrp="1" noRot="1" noChangeAspect="1"/>
+          </p:cNvSpPr>
+          <p:nvPr>
+            <p:ph type="sldImg"/>
+          </p:nvPr>
+        </p:nvSpPr>
+        <p:spPr>
+          <a:xfrm>
+            <a:off x="-171450" y="1143000"/>
+            <a:ext cx="5486400" cy="3086100"/>
+          </a:xfrm>
+          <a:prstGeom prst="rect">
+            <a:avLst/>
+          </a:prstGeom>
+          <a:noFill/>
+          <a:ln w="12700">
+            <a:solidFill>
+              <a:prstClr val="black"/>
+            </a:solidFill>
+          </a:ln>
+        </p:spPr>
+      </p:sp>
+      <p:sp>
+        <p:nvSpPr>
+          <p:cNvPr id="3" name="Notes Placeholder 2"/>
+          <p:cNvSpPr>
+            <a:spLocks noGrp="1"/>
+          </p:cNvSpPr>
+          <p:nvPr>
+            <p:ph type="body" idx="1"/>
+          </p:nvPr>
+        </p:nvSpPr>
+        <p:spPr>
+          <a:xfrm>
+            <a:off x="514350" y="4400550"/>
+            <a:ext cx="4114800" cy="3600450"/>
+          </a:xfrm>
+          <a:prstGeom prst="rect">
+            <a:avLst/>
+          </a:prstGeom>
+        </p:spPr>
+        <p:txBody>
+          <a:bodyPr/>
+          <a:lstStyle/>
+          <a:p>
+            <a:endParaRPr lang="en-US"/>
+          </a:p>
+        </p:txBody>
+      </p:sp>
     </p:spTree>
     <p:extLst>
       <p:ext uri="{BB962C8B-B14F-4D97-AF65-F5344CB8AC3E}">
@@ -645,6 +691,39 @@
       </p:grpSpPr>
       <p:sp>
         <p:nvSpPr>
+          <p:cNvPr id="12" name="Picture Placeholder 13">
+            <a:extLst>
+              <a:ext uri="{FF2B5EF4-FFF2-40B4-BE49-F238E27FC236}">
+                <a16:creationId xmlns:a16="http://schemas.microsoft.com/office/drawing/2014/main" id="{2DB97592-C4D5-B315-7F11-AA14F6EE8A62}"/>
+              </a:ext>
+            </a:extLst>
+          </p:cNvPr>
+          <p:cNvSpPr>
+            <a:spLocks noGrp="1"/>
+          </p:cNvSpPr>
+          <p:nvPr>
+            <p:ph type="pic" sz="quarter" idx="13"/>
+          </p:nvPr>
+        </p:nvSpPr>
+        <p:spPr>
+          <a:xfrm>
+            <a:off x="313593" y="4536078"/>
+            <a:ext cx="2143858" cy="529698"/>
+          </a:xfrm>
+          <a:prstGeom prst="rect">
+            <a:avLst/>
+          </a:prstGeom>
+        </p:spPr>
+        <p:txBody>
+          <a:bodyPr/>
+          <a:lstStyle/>
+          <a:p>
+            <a:endParaRPr lang="en-US" dirty="0"/>
+          </a:p>
+        </p:txBody>
+      </p:sp>
+      <p:sp>
+        <p:nvSpPr>
           <p:cNvPr id="3" name="Shape 1">
             <a:extLst>
               <a:ext uri="{FF2B5EF4-FFF2-40B4-BE49-F238E27FC236}">
@@ -739,69 +818,6 @@
       </p:sp>
       <p:sp>
         <p:nvSpPr>
-          <p:cNvPr id="12" name="Picture Placeholder 13">
-            <a:extLst>
-              <a:ext uri="{FF2B5EF4-FFF2-40B4-BE49-F238E27FC236}">
-                <a16:creationId xmlns:a16="http://schemas.microsoft.com/office/drawing/2014/main" id="{2DB97592-C4D5-B315-7F11-AA14F6EE8A62}"/>
-              </a:ext>
-            </a:extLst>
-          </p:cNvPr>
-          <p:cNvSpPr>
-            <a:spLocks noGrp="1"/>
-          </p:cNvSpPr>
-          <p:nvPr>
-            <p:ph type="pic" sz="quarter" idx="13"/>
-          </p:nvPr>
-        </p:nvSpPr>
-        <p:spPr>
-          <a:xfrm>
-            <a:off x="313593" y="4536078"/>
-            <a:ext cx="2143858" cy="529698"/>
-          </a:xfrm>
-          <a:prstGeom prst="rect">
-            <a:avLst/>
-          </a:prstGeom>
-        </p:spPr>
-        <p:txBody>
-          <a:bodyPr/>
-          <a:lstStyle/>
-          <a:p>
-            <a:endParaRPr lang="en-US" dirty="0"/>
-          </a:p>
-        </p:txBody>
-      </p:sp>
-      <p:pic>
-        <p:nvPicPr>
-          <p:cNvPr id="13" name="Image 0" descr="/home/claude/eo-framework-logo.png">
-            <a:extLst>
-              <a:ext uri="{FF2B5EF4-FFF2-40B4-BE49-F238E27FC236}">
-                <a16:creationId xmlns:a16="http://schemas.microsoft.com/office/drawing/2014/main" id="{25116040-BB88-891D-9118-628A78E99872}"/>
-              </a:ext>
-            </a:extLst>
-          </p:cNvPr>
-          <p:cNvPicPr>
-            <a:picLocks noChangeAspect="1"/>
-          </p:cNvPicPr>
-          <p:nvPr userDrawn="1"/>
-        </p:nvPicPr>
-        <p:blipFill>
-          <a:blip r:embed="rId2"/>
-          <a:stretch>
-            <a:fillRect/>
-          </a:stretch>
-        </p:blipFill>
-        <p:spPr>
-          <a:xfrm>
-            <a:off x="6945879" y="4648200"/>
-            <a:ext cx="1952244" cy="417576"/>
-          </a:xfrm>
-          <a:prstGeom prst="rect">
-            <a:avLst/>
-          </a:prstGeom>
-        </p:spPr>
-      </p:pic>
-      <p:sp>
-        <p:nvSpPr>
           <p:cNvPr id="4" name="Text Placeholder 3">
             <a:extLst>
               <a:ext uri="{FF2B5EF4-FFF2-40B4-BE49-F238E27FC236}">
@@ -829,7 +845,7 @@
           <a:bodyPr/>
           <a:lstStyle>
             <a:lvl1pPr>
-              <a:defRPr sz="2000" baseline="0">
+              <a:defRPr sz="2000" b="1" baseline="0">
                 <a:solidFill>
                   <a:srgbClr val="C00000"/>
                 </a:solidFill>
@@ -875,6 +891,48 @@
             <a:r>
               <a:rPr lang="en-US" dirty="0"/>
               <a:t>Fourth level</a:t>
+            </a:r>
+          </a:p>
+        </p:txBody>
+      </p:sp>
+      <p:sp>
+        <p:nvSpPr>
+          <p:cNvPr id="5" name="Text Placeholder 4">
+            <a:extLst>
+              <a:ext uri="{FF2B5EF4-FFF2-40B4-BE49-F238E27FC236}">
+                <a16:creationId xmlns:a16="http://schemas.microsoft.com/office/drawing/2014/main" id="{57F71806-AFEA-DD6D-E6AA-E2A002E682DE}"/>
+              </a:ext>
+            </a:extLst>
+          </p:cNvPr>
+          <p:cNvSpPr>
+            <a:spLocks noGrp="1"/>
+          </p:cNvSpPr>
+          <p:nvPr>
+            <p:ph type="body" sz="quarter" idx="15" hasCustomPrompt="1"/>
+          </p:nvPr>
+        </p:nvSpPr>
+        <p:spPr>
+          <a:xfrm>
+            <a:off x="5627076" y="4738688"/>
+            <a:ext cx="3218473" cy="238125"/>
+          </a:xfrm>
+          <a:prstGeom prst="rect">
+            <a:avLst/>
+          </a:prstGeom>
+        </p:spPr>
+        <p:txBody>
+          <a:bodyPr/>
+          <a:lstStyle>
+            <a:lvl5pPr algn="r">
+              <a:buNone/>
+              <a:defRPr sz="1100"/>
+            </a:lvl5pPr>
+          </a:lstStyle>
+          <a:p>
+            <a:pPr lvl="4"/>
+            <a:r>
+              <a:rPr lang="en-US" dirty="0"/>
+              <a:t>Project Name</a:t>
             </a:r>
           </a:p>
         </p:txBody>
@@ -911,6 +969,39 @@
       </p:grpSpPr>
       <p:sp>
         <p:nvSpPr>
+          <p:cNvPr id="12" name="Picture Placeholder 13">
+            <a:extLst>
+              <a:ext uri="{FF2B5EF4-FFF2-40B4-BE49-F238E27FC236}">
+                <a16:creationId xmlns:a16="http://schemas.microsoft.com/office/drawing/2014/main" id="{2DB97592-C4D5-B315-7F11-AA14F6EE8A62}"/>
+              </a:ext>
+            </a:extLst>
+          </p:cNvPr>
+          <p:cNvSpPr>
+            <a:spLocks noGrp="1"/>
+          </p:cNvSpPr>
+          <p:nvPr>
+            <p:ph type="pic" sz="quarter" idx="13"/>
+          </p:nvPr>
+        </p:nvSpPr>
+        <p:spPr>
+          <a:xfrm>
+            <a:off x="313593" y="4536078"/>
+            <a:ext cx="2143858" cy="529698"/>
+          </a:xfrm>
+          <a:prstGeom prst="rect">
+            <a:avLst/>
+          </a:prstGeom>
+        </p:spPr>
+        <p:txBody>
+          <a:bodyPr/>
+          <a:lstStyle/>
+          <a:p>
+            <a:endParaRPr lang="en-US" dirty="0"/>
+          </a:p>
+        </p:txBody>
+      </p:sp>
+      <p:sp>
+        <p:nvSpPr>
           <p:cNvPr id="3" name="Shape 1">
             <a:extLst>
               <a:ext uri="{FF2B5EF4-FFF2-40B4-BE49-F238E27FC236}">
@@ -1005,69 +1096,6 @@
       </p:sp>
       <p:sp>
         <p:nvSpPr>
-          <p:cNvPr id="12" name="Picture Placeholder 13">
-            <a:extLst>
-              <a:ext uri="{FF2B5EF4-FFF2-40B4-BE49-F238E27FC236}">
-                <a16:creationId xmlns:a16="http://schemas.microsoft.com/office/drawing/2014/main" id="{2DB97592-C4D5-B315-7F11-AA14F6EE8A62}"/>
-              </a:ext>
-            </a:extLst>
-          </p:cNvPr>
-          <p:cNvSpPr>
-            <a:spLocks noGrp="1"/>
-          </p:cNvSpPr>
-          <p:nvPr>
-            <p:ph type="pic" sz="quarter" idx="13"/>
-          </p:nvPr>
-        </p:nvSpPr>
-        <p:spPr>
-          <a:xfrm>
-            <a:off x="313593" y="4536078"/>
-            <a:ext cx="2143858" cy="529698"/>
-          </a:xfrm>
-          <a:prstGeom prst="rect">
-            <a:avLst/>
-          </a:prstGeom>
-        </p:spPr>
-        <p:txBody>
-          <a:bodyPr/>
-          <a:lstStyle/>
-          <a:p>
-            <a:endParaRPr lang="en-US" dirty="0"/>
-          </a:p>
-        </p:txBody>
-      </p:sp>
-      <p:pic>
-        <p:nvPicPr>
-          <p:cNvPr id="13" name="Image 0" descr="/home/claude/eo-framework-logo.png">
-            <a:extLst>
-              <a:ext uri="{FF2B5EF4-FFF2-40B4-BE49-F238E27FC236}">
-                <a16:creationId xmlns:a16="http://schemas.microsoft.com/office/drawing/2014/main" id="{25116040-BB88-891D-9118-628A78E99872}"/>
-              </a:ext>
-            </a:extLst>
-          </p:cNvPr>
-          <p:cNvPicPr>
-            <a:picLocks noChangeAspect="1"/>
-          </p:cNvPicPr>
-          <p:nvPr userDrawn="1"/>
-        </p:nvPicPr>
-        <p:blipFill>
-          <a:blip r:embed="rId2"/>
-          <a:stretch>
-            <a:fillRect/>
-          </a:stretch>
-        </p:blipFill>
-        <p:spPr>
-          <a:xfrm>
-            <a:off x="6945879" y="4648200"/>
-            <a:ext cx="1952244" cy="417576"/>
-          </a:xfrm>
-          <a:prstGeom prst="rect">
-            <a:avLst/>
-          </a:prstGeom>
-        </p:spPr>
-      </p:pic>
-      <p:sp>
-        <p:nvSpPr>
           <p:cNvPr id="4" name="Text Placeholder 3">
             <a:extLst>
               <a:ext uri="{FF2B5EF4-FFF2-40B4-BE49-F238E27FC236}">
@@ -1127,6 +1155,48 @@
             <a:r>
               <a:rPr lang="en-US" dirty="0"/>
               <a:t>Bullet Point 2</a:t>
+            </a:r>
+          </a:p>
+        </p:txBody>
+      </p:sp>
+      <p:sp>
+        <p:nvSpPr>
+          <p:cNvPr id="5" name="Text Placeholder 4">
+            <a:extLst>
+              <a:ext uri="{FF2B5EF4-FFF2-40B4-BE49-F238E27FC236}">
+                <a16:creationId xmlns:a16="http://schemas.microsoft.com/office/drawing/2014/main" id="{162079A5-28FD-9D2F-2B9B-2FC8F9339A31}"/>
+              </a:ext>
+            </a:extLst>
+          </p:cNvPr>
+          <p:cNvSpPr>
+            <a:spLocks noGrp="1"/>
+          </p:cNvSpPr>
+          <p:nvPr>
+            <p:ph type="body" sz="quarter" idx="15" hasCustomPrompt="1"/>
+          </p:nvPr>
+        </p:nvSpPr>
+        <p:spPr>
+          <a:xfrm>
+            <a:off x="5627076" y="4738688"/>
+            <a:ext cx="3218473" cy="238125"/>
+          </a:xfrm>
+          <a:prstGeom prst="rect">
+            <a:avLst/>
+          </a:prstGeom>
+        </p:spPr>
+        <p:txBody>
+          <a:bodyPr/>
+          <a:lstStyle>
+            <a:lvl5pPr algn="r">
+              <a:buNone/>
+              <a:defRPr sz="1100"/>
+            </a:lvl5pPr>
+          </a:lstStyle>
+          <a:p>
+            <a:pPr lvl="4"/>
+            <a:r>
+              <a:rPr lang="en-US" dirty="0"/>
+              <a:t>Project Name</a:t>
             </a:r>
           </a:p>
         </p:txBody>
@@ -1163,6 +1233,39 @@
       </p:grpSpPr>
       <p:sp>
         <p:nvSpPr>
+          <p:cNvPr id="10" name="Picture Placeholder 13">
+            <a:extLst>
+              <a:ext uri="{FF2B5EF4-FFF2-40B4-BE49-F238E27FC236}">
+                <a16:creationId xmlns:a16="http://schemas.microsoft.com/office/drawing/2014/main" id="{6A0FA445-7602-F06E-EC73-5504EBF827CC}"/>
+              </a:ext>
+            </a:extLst>
+          </p:cNvPr>
+          <p:cNvSpPr>
+            <a:spLocks noGrp="1"/>
+          </p:cNvSpPr>
+          <p:nvPr>
+            <p:ph type="pic" sz="quarter" idx="14"/>
+          </p:nvPr>
+        </p:nvSpPr>
+        <p:spPr>
+          <a:xfrm>
+            <a:off x="313592" y="4536078"/>
+            <a:ext cx="2121877" cy="529698"/>
+          </a:xfrm>
+          <a:prstGeom prst="rect">
+            <a:avLst/>
+          </a:prstGeom>
+        </p:spPr>
+        <p:txBody>
+          <a:bodyPr/>
+          <a:lstStyle/>
+          <a:p>
+            <a:endParaRPr lang="en-US" dirty="0"/>
+          </a:p>
+        </p:txBody>
+      </p:sp>
+      <p:sp>
+        <p:nvSpPr>
           <p:cNvPr id="3" name="Shape 1">
             <a:extLst>
               <a:ext uri="{FF2B5EF4-FFF2-40B4-BE49-F238E27FC236}">
@@ -1255,69 +1358,6 @@
           </a:p>
         </p:txBody>
       </p:sp>
-      <p:pic>
-        <p:nvPicPr>
-          <p:cNvPr id="8" name="Image 0" descr="/home/claude/eo-framework-logo.png">
-            <a:extLst>
-              <a:ext uri="{FF2B5EF4-FFF2-40B4-BE49-F238E27FC236}">
-                <a16:creationId xmlns:a16="http://schemas.microsoft.com/office/drawing/2014/main" id="{4B7035C6-0EF1-6BD3-318E-553D1AAD6709}"/>
-              </a:ext>
-            </a:extLst>
-          </p:cNvPr>
-          <p:cNvPicPr>
-            <a:picLocks noChangeAspect="1"/>
-          </p:cNvPicPr>
-          <p:nvPr userDrawn="1"/>
-        </p:nvPicPr>
-        <p:blipFill>
-          <a:blip r:embed="rId2"/>
-          <a:stretch>
-            <a:fillRect/>
-          </a:stretch>
-        </p:blipFill>
-        <p:spPr>
-          <a:xfrm>
-            <a:off x="6945879" y="4648200"/>
-            <a:ext cx="1952244" cy="417576"/>
-          </a:xfrm>
-          <a:prstGeom prst="rect">
-            <a:avLst/>
-          </a:prstGeom>
-        </p:spPr>
-      </p:pic>
-      <p:sp>
-        <p:nvSpPr>
-          <p:cNvPr id="10" name="Picture Placeholder 13">
-            <a:extLst>
-              <a:ext uri="{FF2B5EF4-FFF2-40B4-BE49-F238E27FC236}">
-                <a16:creationId xmlns:a16="http://schemas.microsoft.com/office/drawing/2014/main" id="{6A0FA445-7602-F06E-EC73-5504EBF827CC}"/>
-              </a:ext>
-            </a:extLst>
-          </p:cNvPr>
-          <p:cNvSpPr>
-            <a:spLocks noGrp="1"/>
-          </p:cNvSpPr>
-          <p:nvPr>
-            <p:ph type="pic" sz="quarter" idx="14"/>
-          </p:nvPr>
-        </p:nvSpPr>
-        <p:spPr>
-          <a:xfrm>
-            <a:off x="313592" y="4536078"/>
-            <a:ext cx="2121877" cy="529698"/>
-          </a:xfrm>
-          <a:prstGeom prst="rect">
-            <a:avLst/>
-          </a:prstGeom>
-        </p:spPr>
-        <p:txBody>
-          <a:bodyPr/>
-          <a:lstStyle/>
-          <a:p>
-            <a:endParaRPr lang="en-US" dirty="0"/>
-          </a:p>
-        </p:txBody>
-      </p:sp>
       <p:sp>
         <p:nvSpPr>
           <p:cNvPr id="6" name="Text Placeholder 5">
@@ -1337,7 +1377,7 @@
         <p:spPr>
           <a:xfrm>
             <a:off x="193675" y="678433"/>
-            <a:ext cx="4462463" cy="3785515"/>
+            <a:ext cx="4431079" cy="3785515"/>
           </a:xfrm>
           <a:prstGeom prst="rect">
             <a:avLst/>
@@ -1347,7 +1387,7 @@
           <a:bodyPr/>
           <a:lstStyle>
             <a:lvl1pPr>
-              <a:defRPr sz="1800">
+              <a:defRPr sz="1800" b="1">
                 <a:solidFill>
                   <a:srgbClr val="C00000"/>
                 </a:solidFill>
@@ -1421,8 +1461,8 @@
         </p:nvSpPr>
         <p:spPr>
           <a:xfrm>
-            <a:off x="4840288" y="678433"/>
-            <a:ext cx="4110037" cy="3785515"/>
+            <a:off x="4721470" y="678433"/>
+            <a:ext cx="4228856" cy="3785515"/>
           </a:xfrm>
           <a:prstGeom prst="rect">
             <a:avLst/>
@@ -1432,7 +1472,7 @@
           <a:bodyPr/>
           <a:lstStyle>
             <a:lvl1pPr>
-              <a:defRPr sz="1800">
+              <a:defRPr sz="1800" b="1">
                 <a:solidFill>
                   <a:srgbClr val="C00000"/>
                 </a:solidFill>
@@ -1484,6 +1524,48 @@
             <a:r>
               <a:rPr lang="en-US" dirty="0"/>
               <a:t>Fifth level</a:t>
+            </a:r>
+          </a:p>
+        </p:txBody>
+      </p:sp>
+      <p:sp>
+        <p:nvSpPr>
+          <p:cNvPr id="4" name="Text Placeholder 4">
+            <a:extLst>
+              <a:ext uri="{FF2B5EF4-FFF2-40B4-BE49-F238E27FC236}">
+                <a16:creationId xmlns:a16="http://schemas.microsoft.com/office/drawing/2014/main" id="{5DF49ED0-89F0-F008-ADD7-D71F338C8B9B}"/>
+              </a:ext>
+            </a:extLst>
+          </p:cNvPr>
+          <p:cNvSpPr>
+            <a:spLocks noGrp="1"/>
+          </p:cNvSpPr>
+          <p:nvPr>
+            <p:ph type="body" sz="quarter" idx="15" hasCustomPrompt="1"/>
+          </p:nvPr>
+        </p:nvSpPr>
+        <p:spPr>
+          <a:xfrm>
+            <a:off x="5697414" y="4681864"/>
+            <a:ext cx="3218473" cy="238125"/>
+          </a:xfrm>
+          <a:prstGeom prst="rect">
+            <a:avLst/>
+          </a:prstGeom>
+        </p:spPr>
+        <p:txBody>
+          <a:bodyPr/>
+          <a:lstStyle>
+            <a:lvl5pPr algn="r">
+              <a:buNone/>
+              <a:defRPr sz="1100"/>
+            </a:lvl5pPr>
+          </a:lstStyle>
+          <a:p>
+            <a:pPr lvl="4"/>
+            <a:r>
+              <a:rPr lang="en-US" dirty="0"/>
+              <a:t>Project Name</a:t>
             </a:r>
           </a:p>
         </p:txBody>
@@ -1520,6 +1602,39 @@
       </p:grpSpPr>
       <p:sp>
         <p:nvSpPr>
+          <p:cNvPr id="12" name="Picture Placeholder 13">
+            <a:extLst>
+              <a:ext uri="{FF2B5EF4-FFF2-40B4-BE49-F238E27FC236}">
+                <a16:creationId xmlns:a16="http://schemas.microsoft.com/office/drawing/2014/main" id="{2DB97592-C4D5-B315-7F11-AA14F6EE8A62}"/>
+              </a:ext>
+            </a:extLst>
+          </p:cNvPr>
+          <p:cNvSpPr>
+            <a:spLocks noGrp="1"/>
+          </p:cNvSpPr>
+          <p:nvPr>
+            <p:ph type="pic" sz="quarter" idx="13"/>
+          </p:nvPr>
+        </p:nvSpPr>
+        <p:spPr>
+          <a:xfrm>
+            <a:off x="313592" y="4536078"/>
+            <a:ext cx="2126273" cy="529698"/>
+          </a:xfrm>
+          <a:prstGeom prst="rect">
+            <a:avLst/>
+          </a:prstGeom>
+        </p:spPr>
+        <p:txBody>
+          <a:bodyPr/>
+          <a:lstStyle/>
+          <a:p>
+            <a:endParaRPr lang="en-US" dirty="0"/>
+          </a:p>
+        </p:txBody>
+      </p:sp>
+      <p:sp>
+        <p:nvSpPr>
           <p:cNvPr id="3" name="Shape 1">
             <a:extLst>
               <a:ext uri="{FF2B5EF4-FFF2-40B4-BE49-F238E27FC236}">
@@ -1641,69 +1756,6 @@
       </p:sp>
       <p:sp>
         <p:nvSpPr>
-          <p:cNvPr id="12" name="Picture Placeholder 13">
-            <a:extLst>
-              <a:ext uri="{FF2B5EF4-FFF2-40B4-BE49-F238E27FC236}">
-                <a16:creationId xmlns:a16="http://schemas.microsoft.com/office/drawing/2014/main" id="{2DB97592-C4D5-B315-7F11-AA14F6EE8A62}"/>
-              </a:ext>
-            </a:extLst>
-          </p:cNvPr>
-          <p:cNvSpPr>
-            <a:spLocks noGrp="1"/>
-          </p:cNvSpPr>
-          <p:nvPr>
-            <p:ph type="pic" sz="quarter" idx="13"/>
-          </p:nvPr>
-        </p:nvSpPr>
-        <p:spPr>
-          <a:xfrm>
-            <a:off x="313592" y="4536078"/>
-            <a:ext cx="2126273" cy="529698"/>
-          </a:xfrm>
-          <a:prstGeom prst="rect">
-            <a:avLst/>
-          </a:prstGeom>
-        </p:spPr>
-        <p:txBody>
-          <a:bodyPr/>
-          <a:lstStyle/>
-          <a:p>
-            <a:endParaRPr lang="en-US" dirty="0"/>
-          </a:p>
-        </p:txBody>
-      </p:sp>
-      <p:pic>
-        <p:nvPicPr>
-          <p:cNvPr id="13" name="Image 0" descr="/home/claude/eo-framework-logo.png">
-            <a:extLst>
-              <a:ext uri="{FF2B5EF4-FFF2-40B4-BE49-F238E27FC236}">
-                <a16:creationId xmlns:a16="http://schemas.microsoft.com/office/drawing/2014/main" id="{25116040-BB88-891D-9118-628A78E99872}"/>
-              </a:ext>
-            </a:extLst>
-          </p:cNvPr>
-          <p:cNvPicPr>
-            <a:picLocks noChangeAspect="1"/>
-          </p:cNvPicPr>
-          <p:nvPr userDrawn="1"/>
-        </p:nvPicPr>
-        <p:blipFill>
-          <a:blip r:embed="rId2"/>
-          <a:stretch>
-            <a:fillRect/>
-          </a:stretch>
-        </p:blipFill>
-        <p:spPr>
-          <a:xfrm>
-            <a:off x="6945879" y="4648200"/>
-            <a:ext cx="1952244" cy="417576"/>
-          </a:xfrm>
-          <a:prstGeom prst="rect">
-            <a:avLst/>
-          </a:prstGeom>
-        </p:spPr>
-      </p:pic>
-      <p:sp>
-        <p:nvSpPr>
           <p:cNvPr id="5" name="Table Placeholder 4">
             <a:extLst>
               <a:ext uri="{FF2B5EF4-FFF2-40B4-BE49-F238E27FC236}">
@@ -1732,6 +1784,48 @@
           <a:lstStyle/>
           <a:p>
             <a:endParaRPr lang="en-US"/>
+          </a:p>
+        </p:txBody>
+      </p:sp>
+      <p:sp>
+        <p:nvSpPr>
+          <p:cNvPr id="4" name="Text Placeholder 4">
+            <a:extLst>
+              <a:ext uri="{FF2B5EF4-FFF2-40B4-BE49-F238E27FC236}">
+                <a16:creationId xmlns:a16="http://schemas.microsoft.com/office/drawing/2014/main" id="{A00DC936-676C-1BAA-B4B4-D45CC5951D6E}"/>
+              </a:ext>
+            </a:extLst>
+          </p:cNvPr>
+          <p:cNvSpPr>
+            <a:spLocks noGrp="1"/>
+          </p:cNvSpPr>
+          <p:nvPr>
+            <p:ph type="body" sz="quarter" idx="15" hasCustomPrompt="1"/>
+          </p:nvPr>
+        </p:nvSpPr>
+        <p:spPr>
+          <a:xfrm>
+            <a:off x="5749315" y="4681864"/>
+            <a:ext cx="3218473" cy="238125"/>
+          </a:xfrm>
+          <a:prstGeom prst="rect">
+            <a:avLst/>
+          </a:prstGeom>
+        </p:spPr>
+        <p:txBody>
+          <a:bodyPr/>
+          <a:lstStyle>
+            <a:lvl5pPr algn="r">
+              <a:buNone/>
+              <a:defRPr sz="1100"/>
+            </a:lvl5pPr>
+          </a:lstStyle>
+          <a:p>
+            <a:pPr lvl="4"/>
+            <a:r>
+              <a:rPr lang="en-US" dirty="0"/>
+              <a:t>Project Name</a:t>
+            </a:r>
           </a:p>
         </p:txBody>
       </p:sp>
@@ -1767,6 +1861,39 @@
       </p:grpSpPr>
       <p:sp>
         <p:nvSpPr>
+          <p:cNvPr id="10" name="Picture Placeholder 13">
+            <a:extLst>
+              <a:ext uri="{FF2B5EF4-FFF2-40B4-BE49-F238E27FC236}">
+                <a16:creationId xmlns:a16="http://schemas.microsoft.com/office/drawing/2014/main" id="{6A0FA445-7602-F06E-EC73-5504EBF827CC}"/>
+              </a:ext>
+            </a:extLst>
+          </p:cNvPr>
+          <p:cNvSpPr>
+            <a:spLocks noGrp="1"/>
+          </p:cNvSpPr>
+          <p:nvPr>
+            <p:ph type="pic" sz="quarter" idx="14"/>
+          </p:nvPr>
+        </p:nvSpPr>
+        <p:spPr>
+          <a:xfrm>
+            <a:off x="313592" y="4536078"/>
+            <a:ext cx="2130670" cy="529698"/>
+          </a:xfrm>
+          <a:prstGeom prst="rect">
+            <a:avLst/>
+          </a:prstGeom>
+        </p:spPr>
+        <p:txBody>
+          <a:bodyPr/>
+          <a:lstStyle/>
+          <a:p>
+            <a:endParaRPr lang="en-US" dirty="0"/>
+          </a:p>
+        </p:txBody>
+      </p:sp>
+      <p:sp>
+        <p:nvSpPr>
           <p:cNvPr id="3" name="Shape 1">
             <a:extLst>
               <a:ext uri="{FF2B5EF4-FFF2-40B4-BE49-F238E27FC236}">
@@ -1859,69 +1986,6 @@
           </a:p>
         </p:txBody>
       </p:sp>
-      <p:pic>
-        <p:nvPicPr>
-          <p:cNvPr id="8" name="Image 0" descr="/home/claude/eo-framework-logo.png">
-            <a:extLst>
-              <a:ext uri="{FF2B5EF4-FFF2-40B4-BE49-F238E27FC236}">
-                <a16:creationId xmlns:a16="http://schemas.microsoft.com/office/drawing/2014/main" id="{4B7035C6-0EF1-6BD3-318E-553D1AAD6709}"/>
-              </a:ext>
-            </a:extLst>
-          </p:cNvPr>
-          <p:cNvPicPr>
-            <a:picLocks noChangeAspect="1"/>
-          </p:cNvPicPr>
-          <p:nvPr userDrawn="1"/>
-        </p:nvPicPr>
-        <p:blipFill>
-          <a:blip r:embed="rId2"/>
-          <a:stretch>
-            <a:fillRect/>
-          </a:stretch>
-        </p:blipFill>
-        <p:spPr>
-          <a:xfrm>
-            <a:off x="6945879" y="4648200"/>
-            <a:ext cx="1952244" cy="417576"/>
-          </a:xfrm>
-          <a:prstGeom prst="rect">
-            <a:avLst/>
-          </a:prstGeom>
-        </p:spPr>
-      </p:pic>
-      <p:sp>
-        <p:nvSpPr>
-          <p:cNvPr id="10" name="Picture Placeholder 13">
-            <a:extLst>
-              <a:ext uri="{FF2B5EF4-FFF2-40B4-BE49-F238E27FC236}">
-                <a16:creationId xmlns:a16="http://schemas.microsoft.com/office/drawing/2014/main" id="{6A0FA445-7602-F06E-EC73-5504EBF827CC}"/>
-              </a:ext>
-            </a:extLst>
-          </p:cNvPr>
-          <p:cNvSpPr>
-            <a:spLocks noGrp="1"/>
-          </p:cNvSpPr>
-          <p:nvPr>
-            <p:ph type="pic" sz="quarter" idx="14"/>
-          </p:nvPr>
-        </p:nvSpPr>
-        <p:spPr>
-          <a:xfrm>
-            <a:off x="313592" y="4536078"/>
-            <a:ext cx="2130670" cy="529698"/>
-          </a:xfrm>
-          <a:prstGeom prst="rect">
-            <a:avLst/>
-          </a:prstGeom>
-        </p:spPr>
-        <p:txBody>
-          <a:bodyPr/>
-          <a:lstStyle/>
-          <a:p>
-            <a:endParaRPr lang="en-US" dirty="0"/>
-          </a:p>
-        </p:txBody>
-      </p:sp>
       <p:sp>
         <p:nvSpPr>
           <p:cNvPr id="6" name="Picture Placeholder 5">
@@ -1984,7 +2048,7 @@
           <a:bodyPr/>
           <a:lstStyle>
             <a:lvl1pPr>
-              <a:defRPr sz="1800">
+              <a:defRPr sz="1800" b="1">
                 <a:solidFill>
                   <a:srgbClr val="C00000"/>
                 </a:solidFill>
@@ -2036,6 +2100,48 @@
             <a:r>
               <a:rPr lang="en-US" dirty="0"/>
               <a:t>Fifth level</a:t>
+            </a:r>
+          </a:p>
+        </p:txBody>
+      </p:sp>
+      <p:sp>
+        <p:nvSpPr>
+          <p:cNvPr id="2" name="Text Placeholder 4">
+            <a:extLst>
+              <a:ext uri="{FF2B5EF4-FFF2-40B4-BE49-F238E27FC236}">
+                <a16:creationId xmlns:a16="http://schemas.microsoft.com/office/drawing/2014/main" id="{6D03683B-7C4B-D474-74C5-EC53E3BB515B}"/>
+              </a:ext>
+            </a:extLst>
+          </p:cNvPr>
+          <p:cNvSpPr>
+            <a:spLocks noGrp="1"/>
+          </p:cNvSpPr>
+          <p:nvPr>
+            <p:ph type="body" sz="quarter" idx="17" hasCustomPrompt="1"/>
+          </p:nvPr>
+        </p:nvSpPr>
+        <p:spPr>
+          <a:xfrm>
+            <a:off x="5781065" y="4729530"/>
+            <a:ext cx="3218473" cy="238125"/>
+          </a:xfrm>
+          <a:prstGeom prst="rect">
+            <a:avLst/>
+          </a:prstGeom>
+        </p:spPr>
+        <p:txBody>
+          <a:bodyPr/>
+          <a:lstStyle>
+            <a:lvl5pPr algn="r">
+              <a:buNone/>
+              <a:defRPr sz="1100"/>
+            </a:lvl5pPr>
+          </a:lstStyle>
+          <a:p>
+            <a:pPr lvl="4"/>
+            <a:r>
+              <a:rPr lang="en-US" dirty="0"/>
+              <a:t>Project Name</a:t>
             </a:r>
           </a:p>
         </p:txBody>
@@ -2072,6 +2178,39 @@
       </p:grpSpPr>
       <p:sp>
         <p:nvSpPr>
+          <p:cNvPr id="10" name="Picture Placeholder 13">
+            <a:extLst>
+              <a:ext uri="{FF2B5EF4-FFF2-40B4-BE49-F238E27FC236}">
+                <a16:creationId xmlns:a16="http://schemas.microsoft.com/office/drawing/2014/main" id="{6A0FA445-7602-F06E-EC73-5504EBF827CC}"/>
+              </a:ext>
+            </a:extLst>
+          </p:cNvPr>
+          <p:cNvSpPr>
+            <a:spLocks noGrp="1"/>
+          </p:cNvSpPr>
+          <p:nvPr>
+            <p:ph type="pic" sz="quarter" idx="14"/>
+          </p:nvPr>
+        </p:nvSpPr>
+        <p:spPr>
+          <a:xfrm>
+            <a:off x="313592" y="4536078"/>
+            <a:ext cx="2104294" cy="529698"/>
+          </a:xfrm>
+          <a:prstGeom prst="rect">
+            <a:avLst/>
+          </a:prstGeom>
+        </p:spPr>
+        <p:txBody>
+          <a:bodyPr/>
+          <a:lstStyle/>
+          <a:p>
+            <a:endParaRPr lang="en-US" dirty="0"/>
+          </a:p>
+        </p:txBody>
+      </p:sp>
+      <p:sp>
+        <p:nvSpPr>
           <p:cNvPr id="3" name="Shape 1">
             <a:extLst>
               <a:ext uri="{FF2B5EF4-FFF2-40B4-BE49-F238E27FC236}">
@@ -2164,69 +2303,6 @@
           </a:p>
         </p:txBody>
       </p:sp>
-      <p:pic>
-        <p:nvPicPr>
-          <p:cNvPr id="8" name="Image 0" descr="/home/claude/eo-framework-logo.png">
-            <a:extLst>
-              <a:ext uri="{FF2B5EF4-FFF2-40B4-BE49-F238E27FC236}">
-                <a16:creationId xmlns:a16="http://schemas.microsoft.com/office/drawing/2014/main" id="{4B7035C6-0EF1-6BD3-318E-553D1AAD6709}"/>
-              </a:ext>
-            </a:extLst>
-          </p:cNvPr>
-          <p:cNvPicPr>
-            <a:picLocks noChangeAspect="1"/>
-          </p:cNvPicPr>
-          <p:nvPr userDrawn="1"/>
-        </p:nvPicPr>
-        <p:blipFill>
-          <a:blip r:embed="rId2"/>
-          <a:stretch>
-            <a:fillRect/>
-          </a:stretch>
-        </p:blipFill>
-        <p:spPr>
-          <a:xfrm>
-            <a:off x="6945879" y="4648200"/>
-            <a:ext cx="1952244" cy="417576"/>
-          </a:xfrm>
-          <a:prstGeom prst="rect">
-            <a:avLst/>
-          </a:prstGeom>
-        </p:spPr>
-      </p:pic>
-      <p:sp>
-        <p:nvSpPr>
-          <p:cNvPr id="10" name="Picture Placeholder 13">
-            <a:extLst>
-              <a:ext uri="{FF2B5EF4-FFF2-40B4-BE49-F238E27FC236}">
-                <a16:creationId xmlns:a16="http://schemas.microsoft.com/office/drawing/2014/main" id="{6A0FA445-7602-F06E-EC73-5504EBF827CC}"/>
-              </a:ext>
-            </a:extLst>
-          </p:cNvPr>
-          <p:cNvSpPr>
-            <a:spLocks noGrp="1"/>
-          </p:cNvSpPr>
-          <p:nvPr>
-            <p:ph type="pic" sz="quarter" idx="14"/>
-          </p:nvPr>
-        </p:nvSpPr>
-        <p:spPr>
-          <a:xfrm>
-            <a:off x="313592" y="4536078"/>
-            <a:ext cx="2104294" cy="529698"/>
-          </a:xfrm>
-          <a:prstGeom prst="rect">
-            <a:avLst/>
-          </a:prstGeom>
-        </p:spPr>
-        <p:txBody>
-          <a:bodyPr/>
-          <a:lstStyle/>
-          <a:p>
-            <a:endParaRPr lang="en-US" dirty="0"/>
-          </a:p>
-        </p:txBody>
-      </p:sp>
       <p:sp>
         <p:nvSpPr>
           <p:cNvPr id="5" name="Chart Placeholder 4">
@@ -2289,7 +2365,7 @@
           <a:bodyPr/>
           <a:lstStyle>
             <a:lvl1pPr>
-              <a:defRPr sz="1800">
+              <a:defRPr sz="1800" b="1">
                 <a:solidFill>
                   <a:srgbClr val="C00000"/>
                 </a:solidFill>
@@ -2341,6 +2417,48 @@
             <a:r>
               <a:rPr lang="en-US" dirty="0"/>
               <a:t>Fifth level</a:t>
+            </a:r>
+          </a:p>
+        </p:txBody>
+      </p:sp>
+      <p:sp>
+        <p:nvSpPr>
+          <p:cNvPr id="4" name="Text Placeholder 4">
+            <a:extLst>
+              <a:ext uri="{FF2B5EF4-FFF2-40B4-BE49-F238E27FC236}">
+                <a16:creationId xmlns:a16="http://schemas.microsoft.com/office/drawing/2014/main" id="{A1231DFE-6A5A-950E-159E-9E1D3D45FD36}"/>
+              </a:ext>
+            </a:extLst>
+          </p:cNvPr>
+          <p:cNvSpPr>
+            <a:spLocks noGrp="1"/>
+          </p:cNvSpPr>
+          <p:nvPr>
+            <p:ph type="body" sz="quarter" idx="17" hasCustomPrompt="1"/>
+          </p:nvPr>
+        </p:nvSpPr>
+        <p:spPr>
+          <a:xfrm>
+            <a:off x="5679465" y="4681864"/>
+            <a:ext cx="3218473" cy="238125"/>
+          </a:xfrm>
+          <a:prstGeom prst="rect">
+            <a:avLst/>
+          </a:prstGeom>
+        </p:spPr>
+        <p:txBody>
+          <a:bodyPr/>
+          <a:lstStyle>
+            <a:lvl5pPr algn="r">
+              <a:buNone/>
+              <a:defRPr sz="900"/>
+            </a:lvl5pPr>
+          </a:lstStyle>
+          <a:p>
+            <a:pPr lvl="4"/>
+            <a:r>
+              <a:rPr lang="en-US" dirty="0"/>
+              <a:t>Project Name</a:t>
             </a:r>
           </a:p>
         </p:txBody>
@@ -3155,7 +3273,7 @@
             <a:spLocks noGrp="1"/>
           </p:cNvSpPr>
           <p:nvPr>
-            <p:ph type="pic" idx="10" sz="quarter"/>
+            <p:ph type="pic" idx="13" sz="quarter"/>
           </p:nvPr>
         </p:nvSpPr>
         <p:spPr/>
@@ -3167,7 +3285,7 @@
             <a:spLocks noGrp="1"/>
           </p:cNvSpPr>
           <p:nvPr>
-            <p:ph type="body" idx="12" sz="quarter"/>
+            <p:ph type="body" idx="10" sz="quarter"/>
           </p:nvPr>
         </p:nvSpPr>
         <p:spPr/>
@@ -3175,23 +3293,82 @@
           <a:bodyPr/>
           <a:lstStyle/>
           <a:p>
-            <a:r>
-              <a:t>Presentation Title</a:t>
-            </a:r>
-          </a:p>
-        </p:txBody>
-      </p:sp>
-      <p:sp>
-        <p:nvSpPr>
-          <p:cNvPr id="4" name="Picture Placeholder 3"/>
-          <p:cNvSpPr>
-            <a:spLocks noGrp="1"/>
-          </p:cNvSpPr>
-          <p:nvPr>
-            <p:ph type="pic" idx="13" sz="quarter"/>
+            <a:pPr algn="l"/>
+            <a:r>
+              <a:t>Project Outcomes</a:t>
+            </a:r>
+          </a:p>
+        </p:txBody>
+      </p:sp>
+      <p:sp>
+        <p:nvSpPr>
+          <p:cNvPr id="4" name="Text Placeholder 3"/>
+          <p:cNvSpPr>
+            <a:spLocks noGrp="1"/>
+          </p:cNvSpPr>
+          <p:nvPr>
+            <p:ph type="body" idx="14" sz="quarter"/>
           </p:nvPr>
         </p:nvSpPr>
         <p:spPr/>
+        <p:txBody>
+          <a:bodyPr/>
+          <a:lstStyle/>
+          <a:p>
+            <a:pPr/>
+            <a:r>
+              <a:t>75% faster deployments</a:t>
+            </a:r>
+          </a:p>
+          <a:p>
+            <a:pPr/>
+            <a:r>
+              <a:t>99.7% pipeline success rate</a:t>
+            </a:r>
+          </a:p>
+          <a:p>
+            <a:pPr/>
+            <a:r>
+              <a:t>Zero-touch provisioning</a:t>
+            </a:r>
+          </a:p>
+          <a:p>
+            <a:pPr/>
+            <a:r>
+              <a:t>200+ devices automated</a:t>
+            </a:r>
+          </a:p>
+          <a:p>
+            <a:pPr/>
+            <a:r>
+              <a:t>90% config automation</a:t>
+            </a:r>
+          </a:p>
+          <a:p>
+            <a:pPr/>
+            <a:r>
+              <a:t>Real-time compliance</a:t>
+            </a:r>
+          </a:p>
+          <a:p>
+            <a:pPr/>
+            <a:r>
+              <a:t>270% ROI achieved</a:t>
+            </a:r>
+          </a:p>
+          <a:p>
+            <a:pPr/>
+            <a:r>
+              <a:t>$350K annual savings</a:t>
+            </a:r>
+          </a:p>
+          <a:p>
+            <a:pPr/>
+            <a:r>
+              <a:t>7.6 month payback</a:t>
+            </a:r>
+          </a:p>
+        </p:txBody>
       </p:sp>
       <p:sp>
         <p:nvSpPr>
@@ -3200,279 +3377,7 @@
             <a:spLocks noGrp="1"/>
           </p:cNvSpPr>
           <p:nvPr>
-            <p:ph type="body" idx="14" sz="quarter"/>
-          </p:nvPr>
-        </p:nvSpPr>
-        <p:spPr/>
-        <p:txBody>
-          <a:bodyPr/>
-          <a:lstStyle/>
-          <a:p>
-            <a:r>
-              <a:t>Solution Name</a:t>
-            </a:r>
-          </a:p>
-        </p:txBody>
-      </p:sp>
-      <p:sp>
-        <p:nvSpPr>
-          <p:cNvPr id="6" name="Text Placeholder 5"/>
-          <p:cNvSpPr>
-            <a:spLocks noGrp="1"/>
-          </p:cNvSpPr>
-          <p:nvPr>
             <p:ph type="body" idx="15" sz="quarter"/>
-          </p:nvPr>
-        </p:nvSpPr>
-        <p:spPr/>
-        <p:txBody>
-          <a:bodyPr/>
-          <a:lstStyle/>
-          <a:p>
-            <a:r>
-              <a:t>Presenter Name | November 15, 2025</a:t>
-            </a:r>
-          </a:p>
-        </p:txBody>
-      </p:sp>
-    </p:spTree>
-  </p:cSld>
-  <p:clrMapOvr>
-    <a:masterClrMapping/>
-  </p:clrMapOvr>
-</p:sld>
-</file>
-
-<file path=ppt/slides/slide10.xml><?xml version="1.0" encoding="utf-8"?>
-<p:sld xmlns:a="http://schemas.openxmlformats.org/drawingml/2006/main" xmlns:p="http://schemas.openxmlformats.org/presentationml/2006/main" xmlns:r="http://schemas.openxmlformats.org/officeDocument/2006/relationships">
-  <p:cSld>
-    <p:spTree>
-      <p:nvGrpSpPr>
-        <p:cNvPr id="1" name=""/>
-        <p:cNvGrpSpPr/>
-        <p:nvPr/>
-      </p:nvGrpSpPr>
-      <p:grpSpPr/>
-      <p:sp>
-        <p:nvSpPr>
-          <p:cNvPr id="2" name="Text Placeholder 1"/>
-          <p:cNvSpPr>
-            <a:spLocks noGrp="1"/>
-          </p:cNvSpPr>
-          <p:nvPr>
-            <p:ph type="body" idx="10" sz="quarter"/>
-          </p:nvPr>
-        </p:nvSpPr>
-        <p:spPr/>
-        <p:txBody>
-          <a:bodyPr/>
-          <a:lstStyle/>
-          <a:p>
-            <a:r>
-              <a:t>Training Program Results</a:t>
-            </a:r>
-          </a:p>
-        </p:txBody>
-      </p:sp>
-      <p:sp>
-        <p:nvSpPr>
-          <p:cNvPr id="3" name="Picture Placeholder 2"/>
-          <p:cNvSpPr>
-            <a:spLocks noGrp="1"/>
-          </p:cNvSpPr>
-          <p:nvPr>
-            <p:ph type="pic" idx="13" sz="quarter"/>
-          </p:nvPr>
-        </p:nvSpPr>
-        <p:spPr/>
-      </p:sp>
-      <p:sp>
-        <p:nvSpPr>
-          <p:cNvPr id="4" name="Text Placeholder 3"/>
-          <p:cNvSpPr>
-            <a:spLocks noGrp="1"/>
-          </p:cNvSpPr>
-          <p:nvPr>
-            <p:ph type="body" idx="14" sz="quarter"/>
-          </p:nvPr>
-        </p:nvSpPr>
-        <p:spPr/>
-        <p:txBody>
-          <a:bodyPr/>
-          <a:lstStyle/>
-          <a:p>
-            <a:pPr/>
-            <a:r>
-              <a:rPr b="1"/>
-              <a:t>Network Engineers</a:t>
-            </a:r>
-            <a:r>
-              <a:t>: 25 engineers completed advanced automation training (40 hours each)</a:t>
-            </a:r>
-          </a:p>
-          <a:p>
-            <a:pPr/>
-            <a:r>
-              <a:rPr b="1"/>
-              <a:t>DevOps Engineers</a:t>
-            </a:r>
-            <a:r>
-              <a:t>: 20 engineers completed Cisco integration training (32 hours each)</a:t>
-            </a:r>
-          </a:p>
-          <a:p>
-            <a:pPr/>
-            <a:r>
-              <a:rPr b="1"/>
-              <a:t>Application Developers</a:t>
-            </a:r>
-            <a:r>
-              <a:t>: 60 developers completed network-aware development training (16 hours each)</a:t>
-            </a:r>
-          </a:p>
-          <a:p>
-            <a:pPr/>
-            <a:r>
-              <a:rPr b="1"/>
-              <a:t>Operations Teams</a:t>
-            </a:r>
-            <a:r>
-              <a:t>: 30 operators completed automated operations training (24 hours each)</a:t>
-            </a:r>
-          </a:p>
-          <a:p>
-            <a:pPr/>
-            <a:r>
-              <a:rPr b="1"/>
-              <a:t>Total Training Hours</a:t>
-            </a:r>
-            <a:r>
-              <a:t>: 2,400 hours delivered across all technical teams</a:t>
-            </a:r>
-          </a:p>
-          <a:p>
-            <a:pPr/>
-            <a:r>
-              <a:rPr b="1"/>
-              <a:t>Network Engineers</a:t>
-            </a:r>
-            <a:r>
-              <a:t>: 96% achieved proficiency in network automation and IaC</a:t>
-            </a:r>
-          </a:p>
-          <a:p>
-            <a:pPr/>
-            <a:r>
-              <a:rPr b="1"/>
-              <a:t>DevOps Engineers</a:t>
-            </a:r>
-            <a:r>
-              <a:t>: 95% achieved competency in Cisco API integration</a:t>
-            </a:r>
-          </a:p>
-          <a:p>
-            <a:pPr/>
-            <a:r>
-              <a:rPr b="1"/>
-              <a:t>Application Developers</a:t>
-            </a:r>
-            <a:r>
-              <a:t>: 88% achieved understanding of network automation capabilities</a:t>
-            </a:r>
-          </a:p>
-          <a:p>
-            <a:pPr/>
-            <a:r>
-              <a:rPr b="1"/>
-              <a:t>Operations Teams</a:t>
-            </a:r>
-            <a:r>
-              <a:t>: 92% achieved proficiency in automated monitoring and troubleshooting</a:t>
-            </a:r>
-          </a:p>
-          <a:p>
-            <a:pPr/>
-            <a:r>
-              <a:rPr b="1"/>
-              <a:t>Overall Satisfaction</a:t>
-            </a:r>
-            <a:r>
-              <a:t>: 94% training satisfaction score across all participants</a:t>
-            </a:r>
-          </a:p>
-        </p:txBody>
-      </p:sp>
-    </p:spTree>
-  </p:cSld>
-  <p:clrMapOvr>
-    <a:masterClrMapping/>
-  </p:clrMapOvr>
-</p:sld>
-</file>
-
-<file path=ppt/slides/slide11.xml><?xml version="1.0" encoding="utf-8"?>
-<p:sld xmlns:a="http://schemas.openxmlformats.org/drawingml/2006/main" xmlns:p="http://schemas.openxmlformats.org/presentationml/2006/main" xmlns:r="http://schemas.openxmlformats.org/officeDocument/2006/relationships">
-  <p:cSld>
-    <p:spTree>
-      <p:nvGrpSpPr>
-        <p:cNvPr id="1" name=""/>
-        <p:cNvGrpSpPr/>
-        <p:nvPr/>
-      </p:nvGrpSpPr>
-      <p:grpSpPr/>
-      <p:sp>
-        <p:nvSpPr>
-          <p:cNvPr id="2" name="Text Placeholder 1"/>
-          <p:cNvSpPr>
-            <a:spLocks noGrp="1"/>
-          </p:cNvSpPr>
-          <p:nvPr>
-            <p:ph type="body" idx="10" sz="quarter"/>
-          </p:nvPr>
-        </p:nvSpPr>
-        <p:spPr/>
-        <p:txBody>
-          <a:bodyPr/>
-          <a:lstStyle/>
-          <a:p>
-            <a:r>
-              <a:t>Adoption Metrics</a:t>
-            </a:r>
-          </a:p>
-        </p:txBody>
-      </p:sp>
-      <p:sp>
-        <p:nvSpPr>
-          <p:cNvPr id="3" name="Picture Placeholder 2"/>
-          <p:cNvSpPr>
-            <a:spLocks noGrp="1"/>
-          </p:cNvSpPr>
-          <p:nvPr>
-            <p:ph type="pic" idx="14" sz="quarter"/>
-          </p:nvPr>
-        </p:nvSpPr>
-        <p:spPr/>
-      </p:sp>
-      <p:sp>
-        <p:nvSpPr>
-          <p:cNvPr id="4" name="Chart Placeholder 3"/>
-          <p:cNvSpPr>
-            <a:spLocks noGrp="1"/>
-          </p:cNvSpPr>
-          <p:nvPr>
-            <p:ph type="chart" idx="15" sz="quarter"/>
-          </p:nvPr>
-        </p:nvSpPr>
-        <p:spPr/>
-      </p:sp>
-      <p:sp>
-        <p:nvSpPr>
-          <p:cNvPr id="5" name="Content Placeholder 4"/>
-          <p:cNvSpPr>
-            <a:spLocks noGrp="1"/>
-          </p:cNvSpPr>
-          <p:nvPr>
-            <p:ph idx="16" sz="quarter"/>
           </p:nvPr>
         </p:nvSpPr>
         <p:spPr/>
@@ -3480,933 +3385,6 @@
           <a:bodyPr/>
           <a:lstStyle/>
           <a:p/>
-        </p:txBody>
-      </p:sp>
-    </p:spTree>
-  </p:cSld>
-  <p:clrMapOvr>
-    <a:masterClrMapping/>
-  </p:clrMapOvr>
-</p:sld>
-</file>
-
-<file path=ppt/slides/slide12.xml><?xml version="1.0" encoding="utf-8"?>
-<p:sld xmlns:a="http://schemas.openxmlformats.org/drawingml/2006/main" xmlns:p="http://schemas.openxmlformats.org/presentationml/2006/main" xmlns:r="http://schemas.openxmlformats.org/officeDocument/2006/relationships">
-  <p:cSld>
-    <p:spTree>
-      <p:nvGrpSpPr>
-        <p:cNvPr id="1" name=""/>
-        <p:cNvGrpSpPr/>
-        <p:nvPr/>
-      </p:nvGrpSpPr>
-      <p:grpSpPr/>
-      <p:sp>
-        <p:nvSpPr>
-          <p:cNvPr id="2" name="Text Placeholder 1"/>
-          <p:cNvSpPr>
-            <a:spLocks noGrp="1"/>
-          </p:cNvSpPr>
-          <p:nvPr>
-            <p:ph type="body" idx="10" sz="quarter"/>
-          </p:nvPr>
-        </p:nvSpPr>
-        <p:spPr/>
-        <p:txBody>
-          <a:bodyPr/>
-          <a:lstStyle/>
-          <a:p>
-            <a:r>
-              <a:t>6-Month Enhancement Plan</a:t>
-            </a:r>
-          </a:p>
-        </p:txBody>
-      </p:sp>
-      <p:sp>
-        <p:nvSpPr>
-          <p:cNvPr id="3" name="Picture Placeholder 2"/>
-          <p:cNvSpPr>
-            <a:spLocks noGrp="1"/>
-          </p:cNvSpPr>
-          <p:nvPr>
-            <p:ph type="pic" idx="13" sz="quarter"/>
-          </p:nvPr>
-        </p:nvSpPr>
-        <p:spPr/>
-      </p:sp>
-      <p:sp>
-        <p:nvSpPr>
-          <p:cNvPr id="4" name="Text Placeholder 3"/>
-          <p:cNvSpPr>
-            <a:spLocks noGrp="1"/>
-          </p:cNvSpPr>
-          <p:nvPr>
-            <p:ph type="body" idx="14" sz="quarter"/>
-          </p:nvPr>
-        </p:nvSpPr>
-        <p:spPr/>
-        <p:txBody>
-          <a:bodyPr/>
-          <a:lstStyle/>
-          <a:p>
-            <a:pPr/>
-            <a:r>
-              <a:rPr b="1"/>
-              <a:t>AI-Driven Optimization</a:t>
-            </a:r>
-            <a:r>
-              <a:t>: Machine learning for network performance optimization</a:t>
-            </a:r>
-          </a:p>
-          <a:p>
-            <a:pPr/>
-            <a:r>
-              <a:rPr b="1"/>
-              <a:t>Intent-Based Networking</a:t>
-            </a:r>
-            <a:r>
-              <a:t>: Enhanced intent-based networking with business policy translation</a:t>
-            </a:r>
-          </a:p>
-          <a:p>
-            <a:pPr/>
-            <a:r>
-              <a:rPr b="1"/>
-              <a:t>Multi-Cloud Networking</a:t>
-            </a:r>
-            <a:r>
-              <a:t>: Automated networking across AWS, Azure, and on-premises</a:t>
-            </a:r>
-          </a:p>
-          <a:p>
-            <a:pPr/>
-            <a:r>
-              <a:rPr b="1"/>
-              <a:t>Edge Computing</a:t>
-            </a:r>
-            <a:r>
-              <a:t>: Automated edge network provisioning and management</a:t>
-            </a:r>
-          </a:p>
-          <a:p>
-            <a:pPr/>
-            <a:r>
-              <a:rPr b="1"/>
-              <a:t>5G Integration</a:t>
-            </a:r>
-            <a:r>
-              <a:t>: Integration with Cisco 5G infrastructure for network slicing</a:t>
-            </a:r>
-          </a:p>
-          <a:p>
-            <a:pPr/>
-            <a:r>
-              <a:rPr b="1"/>
-              <a:t>ServiceNow Integration</a:t>
-            </a:r>
-            <a:r>
-              <a:t>: ITSM integration for automated change management</a:t>
-            </a:r>
-          </a:p>
-          <a:p>
-            <a:pPr/>
-            <a:r>
-              <a:rPr b="1"/>
-              <a:t>Splunk Integration</a:t>
-            </a:r>
-            <a:r>
-              <a:t>: Enhanced network analytics and machine learning</a:t>
-            </a:r>
-          </a:p>
-          <a:p>
-            <a:pPr/>
-            <a:r>
-              <a:rPr b="1"/>
-              <a:t>Security Tools</a:t>
-            </a:r>
-            <a:r>
-              <a:t>: Integration with additional security tools and SOAR platforms</a:t>
-            </a:r>
-          </a:p>
-          <a:p>
-            <a:pPr/>
-            <a:r>
-              <a:rPr b="1"/>
-              <a:t>Cloud Platforms</a:t>
-            </a:r>
-            <a:r>
-              <a:t>: Native integration with additional cloud provider networking</a:t>
-            </a:r>
-          </a:p>
-          <a:p>
-            <a:pPr/>
-            <a:r>
-              <a:rPr b="1"/>
-              <a:t>IoT Management</a:t>
-            </a:r>
-            <a:r>
-              <a:t>: Automated IoT device onboarding and network segmentation</a:t>
-            </a:r>
-          </a:p>
-        </p:txBody>
-      </p:sp>
-    </p:spTree>
-  </p:cSld>
-  <p:clrMapOvr>
-    <a:masterClrMapping/>
-  </p:clrMapOvr>
-</p:sld>
-</file>
-
-<file path=ppt/slides/slide13.xml><?xml version="1.0" encoding="utf-8"?>
-<p:sld xmlns:a="http://schemas.openxmlformats.org/drawingml/2006/main" xmlns:p="http://schemas.openxmlformats.org/presentationml/2006/main" xmlns:r="http://schemas.openxmlformats.org/officeDocument/2006/relationships">
-  <p:cSld>
-    <p:spTree>
-      <p:nvGrpSpPr>
-        <p:cNvPr id="1" name=""/>
-        <p:cNvGrpSpPr/>
-        <p:nvPr/>
-      </p:nvGrpSpPr>
-      <p:grpSpPr/>
-      <p:sp>
-        <p:nvSpPr>
-          <p:cNvPr id="2" name="Text Placeholder 1"/>
-          <p:cNvSpPr>
-            <a:spLocks noGrp="1"/>
-          </p:cNvSpPr>
-          <p:nvPr>
-            <p:ph type="body" idx="10" sz="quarter"/>
-          </p:nvPr>
-        </p:nvSpPr>
-        <p:spPr/>
-        <p:txBody>
-          <a:bodyPr/>
-          <a:lstStyle/>
-          <a:p>
-            <a:r>
-              <a:t>12-Month Strategic Initiatives</a:t>
-            </a:r>
-          </a:p>
-        </p:txBody>
-      </p:sp>
-      <p:sp>
-        <p:nvSpPr>
-          <p:cNvPr id="3" name="Picture Placeholder 2"/>
-          <p:cNvSpPr>
-            <a:spLocks noGrp="1"/>
-          </p:cNvSpPr>
-          <p:nvPr>
-            <p:ph type="pic" idx="13" sz="quarter"/>
-          </p:nvPr>
-        </p:nvSpPr>
-        <p:spPr/>
-      </p:sp>
-      <p:sp>
-        <p:nvSpPr>
-          <p:cNvPr id="4" name="Text Placeholder 3"/>
-          <p:cNvSpPr>
-            <a:spLocks noGrp="1"/>
-          </p:cNvSpPr>
-          <p:nvPr>
-            <p:ph type="body" idx="14" sz="quarter"/>
-          </p:nvPr>
-        </p:nvSpPr>
-        <p:spPr/>
-        <p:txBody>
-          <a:bodyPr/>
-          <a:lstStyle/>
-          <a:p>
-            <a:pPr/>
-            <a:r>
-              <a:rPr b="1"/>
-              <a:t>Software-Defined WAN</a:t>
-            </a:r>
-            <a:r>
-              <a:t>: Automated SD-WAN deployment and management</a:t>
-            </a:r>
-          </a:p>
-          <a:p>
-            <a:pPr/>
-            <a:r>
-              <a:rPr b="1"/>
-              <a:t>Network Analytics</a:t>
-            </a:r>
-            <a:r>
-              <a:t>: Advanced network analytics with predictive capabilities</a:t>
-            </a:r>
-          </a:p>
-          <a:p>
-            <a:pPr/>
-            <a:r>
-              <a:rPr b="1"/>
-              <a:t>Zero Trust Networking</a:t>
-            </a:r>
-            <a:r>
-              <a:t>: Automated zero-trust network segmentation</a:t>
-            </a:r>
-          </a:p>
-          <a:p>
-            <a:pPr/>
-            <a:r>
-              <a:rPr b="1"/>
-              <a:t>Quantum Networking</a:t>
-            </a:r>
-            <a:r>
-              <a:t>: Preparation for quantum-safe networking protocols</a:t>
-            </a:r>
-          </a:p>
-          <a:p>
-            <a:pPr/>
-            <a:r>
-              <a:rPr b="1"/>
-              <a:t>Sustainable Networking</a:t>
-            </a:r>
-            <a:r>
-              <a:t>: Green networking automation for energy optimization</a:t>
-            </a:r>
-          </a:p>
-        </p:txBody>
-      </p:sp>
-    </p:spTree>
-  </p:cSld>
-  <p:clrMapOvr>
-    <a:masterClrMapping/>
-  </p:clrMapOvr>
-</p:sld>
-</file>
-
-<file path=ppt/slides/slide14.xml><?xml version="1.0" encoding="utf-8"?>
-<p:sld xmlns:a="http://schemas.openxmlformats.org/drawingml/2006/main" xmlns:p="http://schemas.openxmlformats.org/presentationml/2006/main" xmlns:r="http://schemas.openxmlformats.org/officeDocument/2006/relationships">
-  <p:cSld>
-    <p:spTree>
-      <p:nvGrpSpPr>
-        <p:cNvPr id="1" name=""/>
-        <p:cNvGrpSpPr/>
-        <p:nvPr/>
-      </p:nvGrpSpPr>
-      <p:grpSpPr/>
-      <p:sp>
-        <p:nvSpPr>
-          <p:cNvPr id="2" name="Text Placeholder 1"/>
-          <p:cNvSpPr>
-            <a:spLocks noGrp="1"/>
-          </p:cNvSpPr>
-          <p:nvPr>
-            <p:ph type="body" idx="10" sz="quarter"/>
-          </p:nvPr>
-        </p:nvSpPr>
-        <p:spPr/>
-        <p:txBody>
-          <a:bodyPr/>
-          <a:lstStyle/>
-          <a:p>
-            <a:r>
-              <a:t>Critical Success Elements</a:t>
-            </a:r>
-          </a:p>
-        </p:txBody>
-      </p:sp>
-      <p:sp>
-        <p:nvSpPr>
-          <p:cNvPr id="3" name="Picture Placeholder 2"/>
-          <p:cNvSpPr>
-            <a:spLocks noGrp="1"/>
-          </p:cNvSpPr>
-          <p:nvPr>
-            <p:ph type="pic" idx="13" sz="quarter"/>
-          </p:nvPr>
-        </p:nvSpPr>
-        <p:spPr/>
-      </p:sp>
-      <p:sp>
-        <p:nvSpPr>
-          <p:cNvPr id="4" name="Text Placeholder 3"/>
-          <p:cNvSpPr>
-            <a:spLocks noGrp="1"/>
-          </p:cNvSpPr>
-          <p:nvPr>
-            <p:ph type="body" idx="14" sz="quarter"/>
-          </p:nvPr>
-        </p:nvSpPr>
-        <p:spPr/>
-        <p:txBody>
-          <a:bodyPr/>
-          <a:lstStyle/>
-          <a:p>
-            <a:pPr/>
-            <a:r>
-              <a:rPr b="1"/>
-              <a:t>Cisco Expertise</a:t>
-            </a:r>
-            <a:r>
-              <a:t>: Deep expertise in Cisco technologies and automation capabilities</a:t>
-            </a:r>
-          </a:p>
-          <a:p>
-            <a:pPr/>
-            <a:r>
-              <a:rPr b="1"/>
-              <a:t>DevOps Integration</a:t>
-            </a:r>
-            <a:r>
-              <a:t>: Seamless integration with existing DevOps tools and processes</a:t>
-            </a:r>
-          </a:p>
-          <a:p>
-            <a:pPr/>
-            <a:r>
-              <a:rPr b="1"/>
-              <a:t>API-First Approach</a:t>
-            </a:r>
-            <a:r>
-              <a:t>: Comprehensive API integration enabling custom automation</a:t>
-            </a:r>
-          </a:p>
-          <a:p>
-            <a:pPr/>
-            <a:r>
-              <a:rPr b="1"/>
-              <a:t>Infrastructure as Code</a:t>
-            </a:r>
-            <a:r>
-              <a:t>: Complete network infrastructure managed as code</a:t>
-            </a:r>
-          </a:p>
-          <a:p>
-            <a:pPr/>
-            <a:r>
-              <a:rPr b="1"/>
-              <a:t>Monitoring Integration</a:t>
-            </a:r>
-            <a:r>
-              <a:t>: Unified monitoring of network and application performance</a:t>
-            </a:r>
-          </a:p>
-          <a:p>
-            <a:pPr/>
-            <a:r>
-              <a:rPr b="1"/>
-              <a:t>Network Team Transformation</a:t>
-            </a:r>
-            <a:r>
-              <a:t>: Successfully transformed network team to DevOps model</a:t>
-            </a:r>
-          </a:p>
-          <a:p>
-            <a:pPr/>
-            <a:r>
-              <a:rPr b="1"/>
-              <a:t>Developer Enablement</a:t>
-            </a:r>
-            <a:r>
-              <a:t>: Enabled developers to provision network resources self-service</a:t>
-            </a:r>
-          </a:p>
-          <a:p>
-            <a:pPr/>
-            <a:r>
-              <a:rPr b="1"/>
-              <a:t>Process Integration</a:t>
-            </a:r>
-            <a:r>
-              <a:t>: Integrated network automation into ITIL and change management</a:t>
-            </a:r>
-          </a:p>
-          <a:p>
-            <a:pPr/>
-            <a:r>
-              <a:rPr b="1"/>
-              <a:t>Skills Development</a:t>
-            </a:r>
-            <a:r>
-              <a:t>: Comprehensive upskilling of network and DevOps teams</a:t>
-            </a:r>
-          </a:p>
-          <a:p>
-            <a:pPr/>
-            <a:r>
-              <a:rPr b="1"/>
-              <a:t>Cultural Change</a:t>
-            </a:r>
-            <a:r>
-              <a:t>: Fostered collaboration between network, development, and operations teams</a:t>
-            </a:r>
-          </a:p>
-        </p:txBody>
-      </p:sp>
-    </p:spTree>
-  </p:cSld>
-  <p:clrMapOvr>
-    <a:masterClrMapping/>
-  </p:clrMapOvr>
-</p:sld>
-</file>
-
-<file path=ppt/slides/slide15.xml><?xml version="1.0" encoding="utf-8"?>
-<p:sld xmlns:a="http://schemas.openxmlformats.org/drawingml/2006/main" xmlns:p="http://schemas.openxmlformats.org/presentationml/2006/main" xmlns:r="http://schemas.openxmlformats.org/officeDocument/2006/relationships">
-  <p:cSld>
-    <p:spTree>
-      <p:nvGrpSpPr>
-        <p:cNvPr id="1" name=""/>
-        <p:cNvGrpSpPr/>
-        <p:nvPr/>
-      </p:nvGrpSpPr>
-      <p:grpSpPr/>
-      <p:sp>
-        <p:nvSpPr>
-          <p:cNvPr id="2" name="Text Placeholder 1"/>
-          <p:cNvSpPr>
-            <a:spLocks noGrp="1"/>
-          </p:cNvSpPr>
-          <p:nvPr>
-            <p:ph type="body" idx="10" sz="quarter"/>
-          </p:nvPr>
-        </p:nvSpPr>
-        <p:spPr/>
-        <p:txBody>
-          <a:bodyPr/>
-          <a:lstStyle/>
-          <a:p>
-            <a:r>
-              <a:t>Project Completion Summary</a:t>
-            </a:r>
-          </a:p>
-        </p:txBody>
-      </p:sp>
-      <p:sp>
-        <p:nvSpPr>
-          <p:cNvPr id="3" name="Picture Placeholder 2"/>
-          <p:cNvSpPr>
-            <a:spLocks noGrp="1"/>
-          </p:cNvSpPr>
-          <p:nvPr>
-            <p:ph type="pic" idx="13" sz="quarter"/>
-          </p:nvPr>
-        </p:nvSpPr>
-        <p:spPr/>
-      </p:sp>
-      <p:sp>
-        <p:nvSpPr>
-          <p:cNvPr id="4" name="Text Placeholder 3"/>
-          <p:cNvSpPr>
-            <a:spLocks noGrp="1"/>
-          </p:cNvSpPr>
-          <p:nvPr>
-            <p:ph type="body" idx="14" sz="quarter"/>
-          </p:nvPr>
-        </p:nvSpPr>
-        <p:spPr/>
-        <p:txBody>
-          <a:bodyPr/>
-          <a:lstStyle/>
-          <a:p/>
-        </p:txBody>
-      </p:sp>
-    </p:spTree>
-  </p:cSld>
-  <p:clrMapOvr>
-    <a:masterClrMapping/>
-  </p:clrMapOvr>
-</p:sld>
-</file>
-
-<file path=ppt/slides/slide16.xml><?xml version="1.0" encoding="utf-8"?>
-<p:sld xmlns:a="http://schemas.openxmlformats.org/drawingml/2006/main" xmlns:p="http://schemas.openxmlformats.org/presentationml/2006/main" xmlns:r="http://schemas.openxmlformats.org/officeDocument/2006/relationships">
-  <p:cSld>
-    <p:spTree>
-      <p:nvGrpSpPr>
-        <p:cNvPr id="1" name=""/>
-        <p:cNvGrpSpPr/>
-        <p:nvPr/>
-      </p:nvGrpSpPr>
-      <p:grpSpPr/>
-      <p:sp>
-        <p:nvSpPr>
-          <p:cNvPr id="2" name="Text Placeholder 1"/>
-          <p:cNvSpPr>
-            <a:spLocks noGrp="1"/>
-          </p:cNvSpPr>
-          <p:nvPr>
-            <p:ph type="body" idx="10" sz="quarter"/>
-          </p:nvPr>
-        </p:nvSpPr>
-        <p:spPr/>
-        <p:txBody>
-          <a:bodyPr/>
-          <a:lstStyle/>
-          <a:p>
-            <a:r>
-              <a:t>Key Achievements Recap</a:t>
-            </a:r>
-          </a:p>
-        </p:txBody>
-      </p:sp>
-      <p:sp>
-        <p:nvSpPr>
-          <p:cNvPr id="3" name="Picture Placeholder 2"/>
-          <p:cNvSpPr>
-            <a:spLocks noGrp="1"/>
-          </p:cNvSpPr>
-          <p:nvPr>
-            <p:ph type="pic" idx="13" sz="quarter"/>
-          </p:nvPr>
-        </p:nvSpPr>
-        <p:spPr/>
-      </p:sp>
-      <p:sp>
-        <p:nvSpPr>
-          <p:cNvPr id="4" name="Text Placeholder 3"/>
-          <p:cNvSpPr>
-            <a:spLocks noGrp="1"/>
-          </p:cNvSpPr>
-          <p:nvPr>
-            <p:ph type="body" idx="14" sz="quarter"/>
-          </p:nvPr>
-        </p:nvSpPr>
-        <p:spPr/>
-        <p:txBody>
-          <a:bodyPr/>
-          <a:lstStyle/>
-          <a:p>
-            <a:pPr/>
-            <a:r>
-              <a:rPr b="1"/>
-              <a:t>60% faster deployments</a:t>
-            </a:r>
-            <a:r>
-              <a:t> with automated network and application provisioning</a:t>
-            </a:r>
-          </a:p>
-          <a:p>
-            <a:pPr/>
-            <a:r>
-              <a:rPr b="1"/>
-              <a:t>270% return on investment</a:t>
-            </a:r>
-            <a:r>
-              <a:t> with 45% cost reduction in infrastructure management</a:t>
-            </a:r>
-          </a:p>
-          <a:p>
-            <a:pPr/>
-            <a:r>
-              <a:rPr b="1"/>
-              <a:t>90% network automation</a:t>
-            </a:r>
-            <a:r>
-              <a:t> with infrastructure as code implementation</a:t>
-            </a:r>
-          </a:p>
-          <a:p>
-            <a:pPr/>
-            <a:r>
-              <a:rPr b="1"/>
-              <a:t>94% user satisfaction</a:t>
-            </a:r>
-            <a:r>
-              <a:t> with comprehensive training and change management</a:t>
-            </a:r>
-          </a:p>
-          <a:p>
-            <a:pPr/>
-            <a:r>
-              <a:rPr b="1"/>
-              <a:t>Zero network-related</a:t>
-            </a:r>
-            <a:r>
-              <a:t> deployment failures since automation implementation</a:t>
-            </a:r>
-          </a:p>
-        </p:txBody>
-      </p:sp>
-    </p:spTree>
-  </p:cSld>
-  <p:clrMapOvr>
-    <a:masterClrMapping/>
-  </p:clrMapOvr>
-</p:sld>
-</file>
-
-<file path=ppt/slides/slide17.xml><?xml version="1.0" encoding="utf-8"?>
-<p:sld xmlns:a="http://schemas.openxmlformats.org/drawingml/2006/main" xmlns:p="http://schemas.openxmlformats.org/presentationml/2006/main" xmlns:r="http://schemas.openxmlformats.org/officeDocument/2006/relationships">
-  <p:cSld>
-    <p:spTree>
-      <p:nvGrpSpPr>
-        <p:cNvPr id="1" name=""/>
-        <p:cNvGrpSpPr/>
-        <p:nvPr/>
-      </p:nvGrpSpPr>
-      <p:grpSpPr/>
-      <p:sp>
-        <p:nvSpPr>
-          <p:cNvPr id="2" name="Text Placeholder 1"/>
-          <p:cNvSpPr>
-            <a:spLocks noGrp="1"/>
-          </p:cNvSpPr>
-          <p:nvPr>
-            <p:ph type="body" idx="10" sz="quarter"/>
-          </p:nvPr>
-        </p:nvSpPr>
-        <p:spPr/>
-        <p:txBody>
-          <a:bodyPr/>
-          <a:lstStyle/>
-          <a:p>
-            <a:r>
-              <a:t>Immediate Next Steps (30 Days)</a:t>
-            </a:r>
-          </a:p>
-        </p:txBody>
-      </p:sp>
-      <p:sp>
-        <p:nvSpPr>
-          <p:cNvPr id="3" name="Picture Placeholder 2"/>
-          <p:cNvSpPr>
-            <a:spLocks noGrp="1"/>
-          </p:cNvSpPr>
-          <p:nvPr>
-            <p:ph type="pic" idx="13" sz="quarter"/>
-          </p:nvPr>
-        </p:nvSpPr>
-        <p:spPr/>
-      </p:sp>
-      <p:sp>
-        <p:nvSpPr>
-          <p:cNvPr id="4" name="Text Placeholder 3"/>
-          <p:cNvSpPr>
-            <a:spLocks noGrp="1"/>
-          </p:cNvSpPr>
-          <p:nvPr>
-            <p:ph type="body" idx="14" sz="quarter"/>
-          </p:nvPr>
-        </p:nvSpPr>
-        <p:spPr/>
-        <p:txBody>
-          <a:bodyPr/>
-          <a:lstStyle/>
-          <a:p>
-            <a:pPr/>
-            <a:r>
-              <a:t>Performance Optimization: Fine-tune automation workflows based on production usage</a:t>
-            </a:r>
-          </a:p>
-          <a:p>
-            <a:pPr/>
-            <a:r>
-              <a:t>Advanced Analytics: Implement AI-driven network performance optimization</a:t>
-            </a:r>
-          </a:p>
-          <a:p>
-            <a:pPr/>
-            <a:r>
-              <a:t>Integration Enhancement: Add ServiceNow and additional security tool integrations</a:t>
-            </a:r>
-          </a:p>
-          <a:p>
-            <a:pPr/>
-            <a:r>
-              <a:t>Self-Service Expansion: Expand self-service capabilities for application teams</a:t>
-            </a:r>
-          </a:p>
-          <a:p>
-            <a:pPr/>
-            <a:r>
-              <a:t>Documentation Update: Complete operational runbooks for automated network management</a:t>
-            </a:r>
-          </a:p>
-        </p:txBody>
-      </p:sp>
-    </p:spTree>
-  </p:cSld>
-  <p:clrMapOvr>
-    <a:masterClrMapping/>
-  </p:clrMapOvr>
-</p:sld>
-</file>
-
-<file path=ppt/slides/slide18.xml><?xml version="1.0" encoding="utf-8"?>
-<p:sld xmlns:a="http://schemas.openxmlformats.org/drawingml/2006/main" xmlns:p="http://schemas.openxmlformats.org/presentationml/2006/main" xmlns:r="http://schemas.openxmlformats.org/officeDocument/2006/relationships">
-  <p:cSld>
-    <p:spTree>
-      <p:nvGrpSpPr>
-        <p:cNvPr id="1" name=""/>
-        <p:cNvGrpSpPr/>
-        <p:nvPr/>
-      </p:nvGrpSpPr>
-      <p:grpSpPr/>
-      <p:sp>
-        <p:nvSpPr>
-          <p:cNvPr id="2" name="Text Placeholder 1"/>
-          <p:cNvSpPr>
-            <a:spLocks noGrp="1"/>
-          </p:cNvSpPr>
-          <p:nvPr>
-            <p:ph type="body" idx="10" sz="quarter"/>
-          </p:nvPr>
-        </p:nvSpPr>
-        <p:spPr/>
-        <p:txBody>
-          <a:bodyPr/>
-          <a:lstStyle/>
-          <a:p>
-            <a:r>
-              <a:t>Strategic Initiatives (90 Days)</a:t>
-            </a:r>
-          </a:p>
-        </p:txBody>
-      </p:sp>
-      <p:sp>
-        <p:nvSpPr>
-          <p:cNvPr id="3" name="Picture Placeholder 2"/>
-          <p:cNvSpPr>
-            <a:spLocks noGrp="1"/>
-          </p:cNvSpPr>
-          <p:nvPr>
-            <p:ph type="pic" idx="13" sz="quarter"/>
-          </p:nvPr>
-        </p:nvSpPr>
-        <p:spPr/>
-      </p:sp>
-      <p:sp>
-        <p:nvSpPr>
-          <p:cNvPr id="4" name="Text Placeholder 3"/>
-          <p:cNvSpPr>
-            <a:spLocks noGrp="1"/>
-          </p:cNvSpPr>
-          <p:nvPr>
-            <p:ph type="body" idx="14" sz="quarter"/>
-          </p:nvPr>
-        </p:nvSpPr>
-        <p:spPr/>
-        <p:txBody>
-          <a:bodyPr/>
-          <a:lstStyle/>
-          <a:p>
-            <a:pPr/>
-            <a:r>
-              <a:t>Multi-Cloud Networking: Extend automation to AWS and Azure networking</a:t>
-            </a:r>
-          </a:p>
-          <a:p>
-            <a:pPr/>
-            <a:r>
-              <a:t>Intent-Based Networking: Implement advanced intent-based networking capabilities</a:t>
-            </a:r>
-          </a:p>
-          <a:p>
-            <a:pPr/>
-            <a:r>
-              <a:t>Edge Automation: Automated edge computing network provisioning</a:t>
-            </a:r>
-          </a:p>
-          <a:p>
-            <a:pPr/>
-            <a:r>
-              <a:t>Security Integration: Enhanced security automation with zero-trust principles</a:t>
-            </a:r>
-          </a:p>
-          <a:p>
-            <a:pPr/>
-            <a:r>
-              <a:t>Analytics Platform: Advanced network analytics with machine learning</a:t>
-            </a:r>
-          </a:p>
-        </p:txBody>
-      </p:sp>
-    </p:spTree>
-  </p:cSld>
-  <p:clrMapOvr>
-    <a:masterClrMapping/>
-  </p:clrMapOvr>
-</p:sld>
-</file>
-
-<file path=ppt/slides/slide19.xml><?xml version="1.0" encoding="utf-8"?>
-<p:sld xmlns:a="http://schemas.openxmlformats.org/drawingml/2006/main" xmlns:p="http://schemas.openxmlformats.org/presentationml/2006/main" xmlns:r="http://schemas.openxmlformats.org/officeDocument/2006/relationships">
-  <p:cSld>
-    <p:spTree>
-      <p:nvGrpSpPr>
-        <p:cNvPr id="1" name=""/>
-        <p:cNvGrpSpPr/>
-        <p:nvPr/>
-      </p:nvGrpSpPr>
-      <p:grpSpPr/>
-      <p:sp>
-        <p:nvSpPr>
-          <p:cNvPr id="2" name="Text Placeholder 1"/>
-          <p:cNvSpPr>
-            <a:spLocks noGrp="1"/>
-          </p:cNvSpPr>
-          <p:nvPr>
-            <p:ph type="body" idx="10" sz="quarter"/>
-          </p:nvPr>
-        </p:nvSpPr>
-        <p:spPr/>
-        <p:txBody>
-          <a:bodyPr/>
-          <a:lstStyle/>
-          <a:p>
-            <a:r>
-              <a:t>Long-Term Vision (12 Months)</a:t>
-            </a:r>
-          </a:p>
-        </p:txBody>
-      </p:sp>
-      <p:sp>
-        <p:nvSpPr>
-          <p:cNvPr id="3" name="Picture Placeholder 2"/>
-          <p:cNvSpPr>
-            <a:spLocks noGrp="1"/>
-          </p:cNvSpPr>
-          <p:nvPr>
-            <p:ph type="pic" idx="13" sz="quarter"/>
-          </p:nvPr>
-        </p:nvSpPr>
-        <p:spPr/>
-      </p:sp>
-      <p:sp>
-        <p:nvSpPr>
-          <p:cNvPr id="4" name="Text Placeholder 3"/>
-          <p:cNvSpPr>
-            <a:spLocks noGrp="1"/>
-          </p:cNvSpPr>
-          <p:nvPr>
-            <p:ph type="body" idx="14" sz="quarter"/>
-          </p:nvPr>
-        </p:nvSpPr>
-        <p:spPr/>
-        <p:txBody>
-          <a:bodyPr/>
-          <a:lstStyle/>
-          <a:p>
-            <a:pPr/>
-            <a:r>
-              <a:rPr b="1"/>
-              <a:t>Project Manager</a:t>
-            </a:r>
-            <a:r>
-              <a:t>: [project.manager@company.com]</a:t>
-            </a:r>
-          </a:p>
-          <a:p>
-            <a:pPr/>
-            <a:r>
-              <a:rPr b="1"/>
-              <a:t>Network Automation Architect</a:t>
-            </a:r>
-            <a:r>
-              <a:t>: [network.architect@company.com]</a:t>
-            </a:r>
-          </a:p>
-          <a:p>
-            <a:pPr/>
-            <a:r>
-              <a:rPr b="1"/>
-              <a:t>DevOps Lead</a:t>
-            </a:r>
-            <a:r>
-              <a:t>: [devops.lead@company.com]</a:t>
-            </a:r>
-          </a:p>
         </p:txBody>
       </p:sp>
     </p:spTree>
@@ -4429,7 +3407,19 @@
       <p:grpSpPr/>
       <p:sp>
         <p:nvSpPr>
-          <p:cNvPr id="2" name="Text Placeholder 1"/>
+          <p:cNvPr id="2" name="Picture Placeholder 1"/>
+          <p:cNvSpPr>
+            <a:spLocks noGrp="1"/>
+          </p:cNvSpPr>
+          <p:nvPr>
+            <p:ph type="pic" idx="13" sz="quarter"/>
+          </p:nvPr>
+        </p:nvSpPr>
+        <p:spPr/>
+      </p:sp>
+      <p:sp>
+        <p:nvSpPr>
+          <p:cNvPr id="3" name="Text Placeholder 2"/>
           <p:cNvSpPr>
             <a:spLocks noGrp="1"/>
           </p:cNvSpPr>
@@ -4442,35 +3432,82 @@
           <a:bodyPr/>
           <a:lstStyle/>
           <a:p>
-            <a:r>
-              <a:t>Project Overview</a:t>
-            </a:r>
-          </a:p>
-        </p:txBody>
-      </p:sp>
-      <p:sp>
-        <p:nvSpPr>
-          <p:cNvPr id="3" name="Picture Placeholder 2"/>
-          <p:cNvSpPr>
-            <a:spLocks noGrp="1"/>
-          </p:cNvSpPr>
-          <p:nvPr>
-            <p:ph type="pic" idx="14" sz="quarter"/>
+            <a:pPr algn="l"/>
+            <a:r>
+              <a:t>CI/CD Automation Platform</a:t>
+            </a:r>
+          </a:p>
+        </p:txBody>
+      </p:sp>
+      <p:sp>
+        <p:nvSpPr>
+          <p:cNvPr id="4" name="Text Placeholder 3"/>
+          <p:cNvSpPr>
+            <a:spLocks noGrp="1"/>
+          </p:cNvSpPr>
+          <p:nvPr>
+            <p:ph type="body" idx="14" sz="quarter"/>
           </p:nvPr>
         </p:nvSpPr>
         <p:spPr/>
-      </p:sp>
-      <p:sp>
-        <p:nvSpPr>
-          <p:cNvPr id="4" name="Picture Placeholder 3"/>
-          <p:cNvSpPr>
-            <a:spLocks noGrp="1"/>
-          </p:cNvSpPr>
-          <p:nvPr>
-            <p:ph type="pic" idx="15" sz="quarter"/>
-          </p:nvPr>
-        </p:nvSpPr>
-        <p:spPr/>
+        <p:txBody>
+          <a:bodyPr/>
+          <a:lstStyle/>
+          <a:p>
+            <a:pPr/>
+            <a:r>
+              <a:t>GitLab CI/CD pipelines</a:t>
+            </a:r>
+          </a:p>
+          <a:p>
+            <a:pPr/>
+            <a:r>
+              <a:t>Jenkins build automation</a:t>
+            </a:r>
+          </a:p>
+          <a:p>
+            <a:pPr/>
+            <a:r>
+              <a:t>Terraform IaC modules</a:t>
+            </a:r>
+          </a:p>
+          <a:p>
+            <a:pPr/>
+            <a:r>
+              <a:t>Cisco NSO service models</a:t>
+            </a:r>
+          </a:p>
+          <a:p>
+            <a:pPr/>
+            <a:r>
+              <a:t>Ansible playbook library</a:t>
+            </a:r>
+          </a:p>
+          <a:p>
+            <a:pPr/>
+            <a:r>
+              <a:t>API integration framework</a:t>
+            </a:r>
+          </a:p>
+          <a:p>
+            <a:pPr/>
+            <a:r>
+              <a:t>Cisco DNA Center controller</a:t>
+            </a:r>
+          </a:p>
+          <a:p>
+            <a:pPr/>
+            <a:r>
+              <a:t>NETCONF/YANG automation</a:t>
+            </a:r>
+          </a:p>
+          <a:p>
+            <a:pPr/>
+            <a:r>
+              <a:t>Device configuration mgmt</a:t>
+            </a:r>
+          </a:p>
+        </p:txBody>
       </p:sp>
       <p:sp>
         <p:nvSpPr>
@@ -4479,7 +3516,7 @@
             <a:spLocks noGrp="1"/>
           </p:cNvSpPr>
           <p:nvPr>
-            <p:ph type="body" idx="16" sz="quarter"/>
+            <p:ph type="body" idx="15" sz="quarter"/>
           </p:nvPr>
         </p:nvSpPr>
         <p:spPr/>
@@ -4509,7 +3546,19 @@
       <p:grpSpPr/>
       <p:sp>
         <p:nvSpPr>
-          <p:cNvPr id="2" name="Text Placeholder 1"/>
+          <p:cNvPr id="2" name="Picture Placeholder 1"/>
+          <p:cNvSpPr>
+            <a:spLocks noGrp="1"/>
+          </p:cNvSpPr>
+          <p:nvPr>
+            <p:ph type="pic" idx="13" sz="quarter"/>
+          </p:nvPr>
+        </p:nvSpPr>
+        <p:spPr/>
+      </p:sp>
+      <p:sp>
+        <p:nvSpPr>
+          <p:cNvPr id="3" name="Text Placeholder 2"/>
           <p:cNvSpPr>
             <a:spLocks noGrp="1"/>
           </p:cNvSpPr>
@@ -4522,88 +3571,104 @@
           <a:bodyPr/>
           <a:lstStyle/>
           <a:p>
-            <a:r>
-              <a:t>Key Achievements</a:t>
-            </a:r>
-          </a:p>
-        </p:txBody>
-      </p:sp>
-      <p:sp>
-        <p:nvSpPr>
-          <p:cNvPr id="3" name="Picture Placeholder 2"/>
-          <p:cNvSpPr>
-            <a:spLocks noGrp="1"/>
-          </p:cNvSpPr>
-          <p:nvPr>
-            <p:ph type="pic" idx="13" sz="quarter"/>
+            <a:pPr algn="l"/>
+            <a:r>
+              <a:t>Completed Deliverables</a:t>
+            </a:r>
+          </a:p>
+        </p:txBody>
+      </p:sp>
+      <p:sp>
+        <p:nvSpPr>
+          <p:cNvPr id="4" name="Text Placeholder 3"/>
+          <p:cNvSpPr>
+            <a:spLocks noGrp="1"/>
+          </p:cNvSpPr>
+          <p:nvPr>
+            <p:ph type="body" idx="14" sz="quarter"/>
           </p:nvPr>
         </p:nvSpPr>
         <p:spPr/>
-      </p:sp>
-      <p:sp>
-        <p:nvSpPr>
-          <p:cNvPr id="4" name="Text Placeholder 3"/>
-          <p:cNvSpPr>
-            <a:spLocks noGrp="1"/>
-          </p:cNvSpPr>
-          <p:nvPr>
-            <p:ph type="body" idx="14" sz="quarter"/>
+        <p:txBody>
+          <a:bodyPr/>
+          <a:lstStyle/>
+          <a:p>
+            <a:pPr/>
+            <a:r>
+              <a:t>DNA Center: API integration</a:t>
+            </a:r>
+          </a:p>
+          <a:p>
+            <a:pPr/>
+            <a:r>
+              <a:t>NSO: Service orchestration</a:t>
+            </a:r>
+          </a:p>
+          <a:p>
+            <a:pPr/>
+            <a:r>
+              <a:t>GitLab: 15 pipelines active</a:t>
+            </a:r>
+          </a:p>
+          <a:p>
+            <a:pPr/>
+            <a:r>
+              <a:t>Ansible: 50 playbooks deployed</a:t>
+            </a:r>
+          </a:p>
+          <a:p>
+            <a:pPr/>
+            <a:r>
+              <a:t>Terraform: 25 modules created</a:t>
+            </a:r>
+          </a:p>
+          <a:p>
+            <a:pPr/>
+            <a:r>
+              <a:t>HashiCorp Vault: Secrets mgmt</a:t>
+            </a:r>
+          </a:p>
+          <a:p>
+            <a:pPr/>
+            <a:r>
+              <a:t>ServiceNow: Change automation</a:t>
+            </a:r>
+          </a:p>
+          <a:p>
+            <a:pPr/>
+            <a:r>
+              <a:t>Splunk: Pipeline logging</a:t>
+            </a:r>
+          </a:p>
+          <a:p>
+            <a:pPr/>
+            <a:r>
+              <a:t>Grafana: Metrics dashboards</a:t>
+            </a:r>
+          </a:p>
+          <a:p>
+            <a:pPr/>
+            <a:r>
+              <a:t>NetBox: IPAM integration</a:t>
+            </a:r>
+          </a:p>
+        </p:txBody>
+      </p:sp>
+      <p:sp>
+        <p:nvSpPr>
+          <p:cNvPr id="5" name="Text Placeholder 4"/>
+          <p:cNvSpPr>
+            <a:spLocks noGrp="1"/>
+          </p:cNvSpPr>
+          <p:nvPr>
+            <p:ph type="body" idx="15" sz="quarter"/>
           </p:nvPr>
         </p:nvSpPr>
         <p:spPr/>
         <p:txBody>
           <a:bodyPr/>
           <a:lstStyle/>
-          <a:p>
-            <a:pPr/>
-            <a:r>
-              <a:rPr b="1"/>
-              <a:t>Deployment Acceleration</a:t>
-            </a:r>
-            <a:r>
-              <a:t>: Achieved 60% faster deployment cycles with zero-downtime releases</a:t>
-            </a:r>
-          </a:p>
-          <a:p>
-            <a:pPr/>
-            <a:r>
-              <a:rPr b="1"/>
-              <a:t>Infrastructure Automation</a:t>
-            </a:r>
-            <a:r>
-              <a:t>: Automated 90% of network infrastructure provisioning and configuration</a:t>
-            </a:r>
-          </a:p>
-          <a:p>
-            <a:pPr/>
-            <a:r>
-              <a:rPr b="1"/>
-              <a:t>Pipeline Integration</a:t>
-            </a:r>
-            <a:r>
-              <a:t>: Integrated Cisco network automation with enterprise CI/CD workflows</a:t>
-            </a:r>
-          </a:p>
-          <a:p>
-            <a:pPr/>
-            <a:r>
-              <a:rPr b="1"/>
-              <a:t>Cost Optimization</a:t>
-            </a:r>
-            <a:r>
-              <a:t>: Delivered 45% reduction in deployment and infrastructure management costs</a:t>
-            </a:r>
-          </a:p>
-          <a:p>
-            <a:pPr/>
-            <a:r>
-              <a:rPr b="1"/>
-              <a:t>Network-First DevOps</a:t>
-            </a:r>
-            <a:r>
-              <a:t>: Pioneered network-centric DevOps approach with Cisco technologies</a:t>
-            </a:r>
-          </a:p>
+          <a:p/>
         </p:txBody>
       </p:sp>
     </p:spTree>
@@ -4626,7 +3691,19 @@
       <p:grpSpPr/>
       <p:sp>
         <p:nvSpPr>
-          <p:cNvPr id="2" name="Text Placeholder 1"/>
+          <p:cNvPr id="2" name="Picture Placeholder 1"/>
+          <p:cNvSpPr>
+            <a:spLocks noGrp="1"/>
+          </p:cNvSpPr>
+          <p:nvPr>
+            <p:ph type="pic" idx="13" sz="quarter"/>
+          </p:nvPr>
+        </p:nvSpPr>
+        <p:spPr/>
+      </p:sp>
+      <p:sp>
+        <p:nvSpPr>
+          <p:cNvPr id="3" name="Text Placeholder 2"/>
           <p:cNvSpPr>
             <a:spLocks noGrp="1"/>
           </p:cNvSpPr>
@@ -4639,188 +3716,104 @@
           <a:bodyPr/>
           <a:lstStyle/>
           <a:p>
-            <a:r>
-              <a:t>Primary Business Outcomes</a:t>
-            </a:r>
-          </a:p>
-        </p:txBody>
-      </p:sp>
-      <p:sp>
-        <p:nvSpPr>
-          <p:cNvPr id="3" name="Picture Placeholder 2"/>
-          <p:cNvSpPr>
-            <a:spLocks noGrp="1"/>
-          </p:cNvSpPr>
-          <p:nvPr>
-            <p:ph type="pic" idx="13" sz="quarter"/>
+            <a:pPr algn="l"/>
+            <a:r>
+              <a:t>Key Performance Indicators</a:t>
+            </a:r>
+          </a:p>
+        </p:txBody>
+      </p:sp>
+      <p:sp>
+        <p:nvSpPr>
+          <p:cNvPr id="4" name="Text Placeholder 3"/>
+          <p:cNvSpPr>
+            <a:spLocks noGrp="1"/>
+          </p:cNvSpPr>
+          <p:nvPr>
+            <p:ph type="body" idx="14" sz="quarter"/>
           </p:nvPr>
         </p:nvSpPr>
         <p:spPr/>
-      </p:sp>
-      <p:sp>
-        <p:nvSpPr>
-          <p:cNvPr id="4" name="Text Placeholder 3"/>
-          <p:cNvSpPr>
-            <a:spLocks noGrp="1"/>
-          </p:cNvSpPr>
-          <p:nvPr>
-            <p:ph type="body" idx="14" sz="quarter"/>
+        <p:txBody>
+          <a:bodyPr/>
+          <a:lstStyle/>
+          <a:p>
+            <a:pPr/>
+            <a:r>
+              <a:t>50 Ansible playbooks deployed</a:t>
+            </a:r>
+          </a:p>
+          <a:p>
+            <a:pPr/>
+            <a:r>
+              <a:t>25 Terraform modules created</a:t>
+            </a:r>
+          </a:p>
+          <a:p>
+            <a:pPr/>
+            <a:r>
+              <a:t>15 CI/CD pipelines configured</a:t>
+            </a:r>
+          </a:p>
+          <a:p>
+            <a:pPr/>
+            <a:r>
+              <a:t>200+ network devices managed</a:t>
+            </a:r>
+          </a:p>
+          <a:p>
+            <a:pPr/>
+            <a:r>
+              <a:t>120 microservices automated</a:t>
+            </a:r>
+          </a:p>
+          <a:p>
+            <a:pPr/>
+            <a:r>
+              <a:t>99.7% pipeline success rate</a:t>
+            </a:r>
+          </a:p>
+          <a:p>
+            <a:pPr/>
+            <a:r>
+              <a:t>75% deployment time reduction</a:t>
+            </a:r>
+          </a:p>
+          <a:p>
+            <a:pPr/>
+            <a:r>
+              <a:t>85% self-service adoption</a:t>
+            </a:r>
+          </a:p>
+          <a:p>
+            <a:pPr/>
+            <a:r>
+              <a:t>Zero unplanned outages</a:t>
+            </a:r>
+          </a:p>
+          <a:p>
+            <a:pPr/>
+            <a:r>
+              <a:t>100% rollback capability</a:t>
+            </a:r>
+          </a:p>
+        </p:txBody>
+      </p:sp>
+      <p:sp>
+        <p:nvSpPr>
+          <p:cNvPr id="5" name="Text Placeholder 4"/>
+          <p:cNvSpPr>
+            <a:spLocks noGrp="1"/>
+          </p:cNvSpPr>
+          <p:nvPr>
+            <p:ph type="body" idx="15" sz="quarter"/>
           </p:nvPr>
         </p:nvSpPr>
         <p:spPr/>
         <p:txBody>
           <a:bodyPr/>
           <a:lstStyle/>
-          <a:p>
-            <a:pPr/>
-            <a:r>
-              <a:rPr b="1"/>
-              <a:t>Network Integration</a:t>
-            </a:r>
-            <a:r>
-              <a:t>: Seamless integration of network provisioning with application deployment</a:t>
-            </a:r>
-          </a:p>
-          <a:p>
-            <a:pPr/>
-            <a:r>
-              <a:rPr b="1"/>
-              <a:t>Infrastructure as Code</a:t>
-            </a:r>
-            <a:r>
-              <a:t>: 90% of network infrastructure now managed through code</a:t>
-            </a:r>
-          </a:p>
-          <a:p>
-            <a:pPr/>
-            <a:r>
-              <a:rPr b="1"/>
-              <a:t>Deployment Speed</a:t>
-            </a:r>
-            <a:r>
-              <a:t>: 60% reduction in end-to-end deployment time including network configuration</a:t>
-            </a:r>
-          </a:p>
-          <a:p>
-            <a:pPr/>
-            <a:r>
-              <a:rPr b="1"/>
-              <a:t>Zero-Touch Deployment</a:t>
-            </a:r>
-            <a:r>
-              <a:t>: Automated network and application deployment with minimal manual intervention</a:t>
-            </a:r>
-          </a:p>
-          <a:p>
-            <a:pPr/>
-            <a:r>
-              <a:rPr b="1"/>
-              <a:t>Environment Consistency</a:t>
-            </a:r>
-            <a:r>
-              <a:t>: Identical network configurations across development, test, and production</a:t>
-            </a:r>
-          </a:p>
-          <a:p>
-            <a:pPr/>
-            <a:r>
-              <a:rPr b="1"/>
-              <a:t>Cost Reduction</a:t>
-            </a:r>
-            <a:r>
-              <a:t>: 45% reduction in total deployment and infrastructure management costs</a:t>
-            </a:r>
-          </a:p>
-          <a:p>
-            <a:pPr/>
-            <a:r>
-              <a:rPr b="1"/>
-              <a:t>Resource Optimization</a:t>
-            </a:r>
-            <a:r>
-              <a:t>: 50% improvement in network engineering team productivity</a:t>
-            </a:r>
-          </a:p>
-          <a:p>
-            <a:pPr/>
-            <a:r>
-              <a:rPr b="1"/>
-              <a:t>Infrastructure Savings</a:t>
-            </a:r>
-            <a:r>
-              <a:t>: 40% reduction in manual network configuration effort</a:t>
-            </a:r>
-          </a:p>
-          <a:p>
-            <a:pPr/>
-            <a:r>
-              <a:rPr b="1"/>
-              <a:t>Downtime Prevention</a:t>
-            </a:r>
-            <a:r>
-              <a:t>: Prevented $2.1M in potential network-related downtime costs</a:t>
-            </a:r>
-          </a:p>
-          <a:p>
-            <a:pPr/>
-            <a:r>
-              <a:rPr b="1"/>
-              <a:t>Tool Consolidation</a:t>
-            </a:r>
-            <a:r>
-              <a:t>: 35% reduction in DevOps tool licensing through Cisco integration</a:t>
-            </a:r>
-          </a:p>
-          <a:p>
-            <a:pPr/>
-            <a:r>
-              <a:rPr b="1"/>
-              <a:t>Network Automation</a:t>
-            </a:r>
-            <a:r>
-              <a:t>: 90% of network operations now automated through CI/CD pipelines</a:t>
-            </a:r>
-          </a:p>
-          <a:p>
-            <a:pPr/>
-            <a:r>
-              <a:rPr b="1"/>
-              <a:t>Configuration Management</a:t>
-            </a:r>
-            <a:r>
-              <a:t>: Centralized network configuration management with version control</a:t>
-            </a:r>
-          </a:p>
-          <a:p>
-            <a:pPr/>
-            <a:r>
-              <a:rPr b="1"/>
-              <a:t>Monitoring Integration</a:t>
-            </a:r>
-            <a:r>
-              <a:t>: Real-time network monitoring integrated with application performance</a:t>
-            </a:r>
-          </a:p>
-          <a:p>
-            <a:pPr/>
-            <a:r>
-              <a:rPr b="1"/>
-              <a:t>Self-Healing Networks</a:t>
-            </a:r>
-            <a:r>
-              <a:t>: Automated network issue detection and remediation</a:t>
-            </a:r>
-          </a:p>
-          <a:p>
-            <a:pPr/>
-            <a:r>
-              <a:rPr b="1"/>
-              <a:t>Compliance Automation</a:t>
-            </a:r>
-            <a:r>
-              <a:t>: Automated network security and compliance validation</a:t>
-            </a:r>
-          </a:p>
+          <a:p/>
         </p:txBody>
       </p:sp>
     </p:spTree>
@@ -4843,7 +3836,19 @@
       <p:grpSpPr/>
       <p:sp>
         <p:nvSpPr>
-          <p:cNvPr id="2" name="Text Placeholder 1"/>
+          <p:cNvPr id="2" name="Picture Placeholder 1"/>
+          <p:cNvSpPr>
+            <a:spLocks noGrp="1"/>
+          </p:cNvSpPr>
+          <p:nvPr>
+            <p:ph type="pic" idx="13" sz="quarter"/>
+          </p:nvPr>
+        </p:nvSpPr>
+        <p:spPr/>
+      </p:sp>
+      <p:sp>
+        <p:nvSpPr>
+          <p:cNvPr id="3" name="Text Placeholder 2"/>
           <p:cNvSpPr>
             <a:spLocks noGrp="1"/>
           </p:cNvSpPr>
@@ -4856,200 +3861,104 @@
           <a:bodyPr/>
           <a:lstStyle/>
           <a:p>
-            <a:r>
-              <a:t>Architecture Delivered</a:t>
-            </a:r>
-          </a:p>
-        </p:txBody>
-      </p:sp>
-      <p:sp>
-        <p:nvSpPr>
-          <p:cNvPr id="3" name="Picture Placeholder 2"/>
-          <p:cNvSpPr>
-            <a:spLocks noGrp="1"/>
-          </p:cNvSpPr>
-          <p:nvPr>
-            <p:ph type="pic" idx="14" sz="quarter"/>
+            <a:pPr algn="l"/>
+            <a:r>
+              <a:t>Validation Outcomes</a:t>
+            </a:r>
+          </a:p>
+        </p:txBody>
+      </p:sp>
+      <p:sp>
+        <p:nvSpPr>
+          <p:cNvPr id="4" name="Text Placeholder 3"/>
+          <p:cNvSpPr>
+            <a:spLocks noGrp="1"/>
+          </p:cNvSpPr>
+          <p:nvPr>
+            <p:ph type="body" idx="14" sz="quarter"/>
           </p:nvPr>
         </p:nvSpPr>
         <p:spPr/>
-      </p:sp>
-      <p:sp>
-        <p:nvSpPr>
-          <p:cNvPr id="4" name="Picture Placeholder 3"/>
-          <p:cNvSpPr>
-            <a:spLocks noGrp="1"/>
-          </p:cNvSpPr>
-          <p:nvPr>
-            <p:ph type="pic" idx="15" sz="quarter"/>
+        <p:txBody>
+          <a:bodyPr/>
+          <a:lstStyle/>
+          <a:p>
+            <a:pPr/>
+            <a:r>
+              <a:t>148 functional tests passed</a:t>
+            </a:r>
+          </a:p>
+          <a:p>
+            <a:pPr/>
+            <a:r>
+              <a:t>25 integration scenarios</a:t>
+            </a:r>
+          </a:p>
+          <a:p>
+            <a:pPr/>
+            <a:r>
+              <a:t>12 performance benchmarks</a:t>
+            </a:r>
+          </a:p>
+          <a:p>
+            <a:pPr/>
+            <a:r>
+              <a:t>8 security assessments</a:t>
+            </a:r>
+          </a:p>
+          <a:p>
+            <a:pPr/>
+            <a:r>
+              <a:t>3 penetration tests</a:t>
+            </a:r>
+          </a:p>
+          <a:p>
+            <a:pPr/>
+            <a:r>
+              <a:t>Zero critical defects</a:t>
+            </a:r>
+          </a:p>
+          <a:p>
+            <a:pPr/>
+            <a:r>
+              <a:t>99.7% test pass rate</a:t>
+            </a:r>
+          </a:p>
+          <a:p>
+            <a:pPr/>
+            <a:r>
+              <a:t>All SLAs validated</a:t>
+            </a:r>
+          </a:p>
+          <a:p>
+            <a:pPr/>
+            <a:r>
+              <a:t>Security compliance confirmed</a:t>
+            </a:r>
+          </a:p>
+          <a:p>
+            <a:pPr/>
+            <a:r>
+              <a:t>DR procedures tested</a:t>
+            </a:r>
+          </a:p>
+        </p:txBody>
+      </p:sp>
+      <p:sp>
+        <p:nvSpPr>
+          <p:cNvPr id="5" name="Text Placeholder 4"/>
+          <p:cNvSpPr>
+            <a:spLocks noGrp="1"/>
+          </p:cNvSpPr>
+          <p:nvPr>
+            <p:ph type="body" idx="15" sz="quarter"/>
           </p:nvPr>
         </p:nvSpPr>
         <p:spPr/>
-      </p:sp>
-      <p:sp>
-        <p:nvSpPr>
-          <p:cNvPr id="5" name="Text Placeholder 4"/>
-          <p:cNvSpPr>
-            <a:spLocks noGrp="1"/>
-          </p:cNvSpPr>
-          <p:nvPr>
-            <p:ph type="body" idx="16" sz="quarter"/>
-          </p:nvPr>
-        </p:nvSpPr>
-        <p:spPr/>
         <p:txBody>
           <a:bodyPr/>
           <a:lstStyle/>
-          <a:p>
-            <a:pPr/>
-            <a:r>
-              <a:rPr b="1"/>
-              <a:t>Cisco DNA Center</a:t>
-            </a:r>
-            <a:r>
-              <a:t>: Software-defined network management and automation</a:t>
-            </a:r>
-          </a:p>
-          <a:p>
-            <a:pPr/>
-            <a:r>
-              <a:rPr b="1"/>
-              <a:t>Cisco NSO (Network Services Orchestrator)</a:t>
-            </a:r>
-            <a:r>
-              <a:t>: Network service orchestration and automation</a:t>
-            </a:r>
-          </a:p>
-          <a:p>
-            <a:pPr/>
-            <a:r>
-              <a:rPr b="1"/>
-              <a:t>Cisco ACI (Application Centric Infrastructure)</a:t>
-            </a:r>
-            <a:r>
-              <a:t>: Policy-based automation for data center</a:t>
-            </a:r>
-          </a:p>
-          <a:p>
-            <a:pPr/>
-            <a:r>
-              <a:rPr b="1"/>
-              <a:t>Cisco Intersight</a:t>
-            </a:r>
-            <a:r>
-              <a:t>: Cloud-based infrastructure management platform</a:t>
-            </a:r>
-          </a:p>
-          <a:p>
-            <a:pPr/>
-            <a:r>
-              <a:rPr b="1"/>
-              <a:t>Cisco DevNet</a:t>
-            </a:r>
-            <a:r>
-              <a:t>: Developer tools and APIs for network automation</a:t>
-            </a:r>
-          </a:p>
-          <a:p>
-            <a:pPr/>
-            <a:r>
-              <a:rPr b="1"/>
-              <a:t>GitLab Enterprise</a:t>
-            </a:r>
-            <a:r>
-              <a:t>: Source code management with Cisco automation integration</a:t>
-            </a:r>
-          </a:p>
-          <a:p>
-            <a:pPr/>
-            <a:r>
-              <a:rPr b="1"/>
-              <a:t>Jenkins</a:t>
-            </a:r>
-            <a:r>
-              <a:t>: Build automation with Cisco network provisioning plugins</a:t>
-            </a:r>
-          </a:p>
-          <a:p>
-            <a:pPr/>
-            <a:r>
-              <a:rPr b="1"/>
-              <a:t>Ansible</a:t>
-            </a:r>
-            <a:r>
-              <a:t>: Configuration management with Cisco modules and playbooks</a:t>
-            </a:r>
-          </a:p>
-          <a:p>
-            <a:pPr/>
-            <a:r>
-              <a:rPr b="1"/>
-              <a:t>Terraform</a:t>
-            </a:r>
-            <a:r>
-              <a:t>: Infrastructure as Code with Cisco provider plugins</a:t>
-            </a:r>
-          </a:p>
-          <a:p>
-            <a:pPr/>
-            <a:r>
-              <a:rPr b="1"/>
-              <a:t>Docker/Kubernetes</a:t>
-            </a:r>
-            <a:r>
-              <a:t>: Containerized applications with Cisco CNI integration</a:t>
-            </a:r>
-          </a:p>
-          <a:p>
-            <a:pPr/>
-            <a:r>
-              <a:rPr b="1"/>
-              <a:t>NETCONF/YANG</a:t>
-            </a:r>
-            <a:r>
-              <a:t>: Standardized network configuration and management</a:t>
-            </a:r>
-          </a:p>
-          <a:p>
-            <a:pPr/>
-            <a:r>
-              <a:rPr b="1"/>
-              <a:t>REST APIs</a:t>
-            </a:r>
-            <a:r>
-              <a:t>: Comprehensive API integration for all Cisco platforms</a:t>
-            </a:r>
-          </a:p>
-          <a:p>
-            <a:pPr/>
-            <a:r>
-              <a:rPr b="1"/>
-              <a:t>Python SDK</a:t>
-            </a:r>
-            <a:r>
-              <a:t>: Custom automation scripts using Cisco Python libraries</a:t>
-            </a:r>
-          </a:p>
-          <a:p>
-            <a:pPr/>
-            <a:r>
-              <a:rPr b="1"/>
-              <a:t>Webhook Integration</a:t>
-            </a:r>
-            <a:r>
-              <a:t>: Event-driven automation triggered by network changes</a:t>
-            </a:r>
-          </a:p>
-          <a:p>
-            <a:pPr/>
-            <a:r>
-              <a:rPr b="1"/>
-              <a:t>Template Engine</a:t>
-            </a:r>
-            <a:r>
-              <a:t>: Jinja2 templates for dynamic network configuration generation</a:t>
-            </a:r>
-          </a:p>
+          <a:p/>
         </p:txBody>
       </p:sp>
     </p:spTree>
@@ -5072,7 +3981,19 @@
       <p:grpSpPr/>
       <p:sp>
         <p:nvSpPr>
-          <p:cNvPr id="2" name="Text Placeholder 1"/>
+          <p:cNvPr id="2" name="Picture Placeholder 1"/>
+          <p:cNvSpPr>
+            <a:spLocks noGrp="1"/>
+          </p:cNvSpPr>
+          <p:nvPr>
+            <p:ph type="pic" idx="13" sz="quarter"/>
+          </p:nvPr>
+        </p:nvSpPr>
+        <p:spPr/>
+      </p:sp>
+      <p:sp>
+        <p:nvSpPr>
+          <p:cNvPr id="3" name="Text Placeholder 2"/>
           <p:cNvSpPr>
             <a:spLocks noGrp="1"/>
           </p:cNvSpPr>
@@ -5085,138 +4006,104 @@
           <a:bodyPr/>
           <a:lstStyle/>
           <a:p>
-            <a:r>
-              <a:t>Implementation Results</a:t>
-            </a:r>
-          </a:p>
-        </p:txBody>
-      </p:sp>
-      <p:sp>
-        <p:nvSpPr>
-          <p:cNvPr id="3" name="Picture Placeholder 2"/>
-          <p:cNvSpPr>
-            <a:spLocks noGrp="1"/>
-          </p:cNvSpPr>
-          <p:nvPr>
-            <p:ph type="pic" idx="13" sz="quarter"/>
+            <a:pPr algn="l"/>
+            <a:r>
+              <a:t>Return on Investment</a:t>
+            </a:r>
+          </a:p>
+        </p:txBody>
+      </p:sp>
+      <p:sp>
+        <p:nvSpPr>
+          <p:cNvPr id="4" name="Text Placeholder 3"/>
+          <p:cNvSpPr>
+            <a:spLocks noGrp="1"/>
+          </p:cNvSpPr>
+          <p:nvPr>
+            <p:ph type="body" idx="14" sz="quarter"/>
           </p:nvPr>
         </p:nvSpPr>
         <p:spPr/>
-      </p:sp>
-      <p:sp>
-        <p:nvSpPr>
-          <p:cNvPr id="4" name="Text Placeholder 3"/>
-          <p:cNvSpPr>
-            <a:spLocks noGrp="1"/>
-          </p:cNvSpPr>
-          <p:nvPr>
-            <p:ph type="body" idx="14" sz="quarter"/>
+        <p:txBody>
+          <a:bodyPr/>
+          <a:lstStyle/>
+          <a:p>
+            <a:pPr/>
+            <a:r>
+              <a:t>Platform licensing: $280K</a:t>
+            </a:r>
+          </a:p>
+          <a:p>
+            <a:pPr/>
+            <a:r>
+              <a:t>Professional services: $165K</a:t>
+            </a:r>
+          </a:p>
+          <a:p>
+            <a:pPr/>
+            <a:r>
+              <a:t>Tool integration: $75K</a:t>
+            </a:r>
+          </a:p>
+          <a:p>
+            <a:pPr/>
+            <a:r>
+              <a:t>Training: $95K</a:t>
+            </a:r>
+          </a:p>
+          <a:p>
+            <a:pPr/>
+            <a:r>
+              <a:t>Total investment: $615K</a:t>
+            </a:r>
+          </a:p>
+          <a:p>
+            <a:pPr/>
+            <a:r>
+              <a:t>Labor savings: $350K</a:t>
+            </a:r>
+          </a:p>
+          <a:p>
+            <a:pPr/>
+            <a:r>
+              <a:t>Infrastructure efficiency: $180K</a:t>
+            </a:r>
+          </a:p>
+          <a:p>
+            <a:pPr/>
+            <a:r>
+              <a:t>Downtime prevention: $140K</a:t>
+            </a:r>
+          </a:p>
+          <a:p>
+            <a:pPr/>
+            <a:r>
+              <a:t>Tool consolidation: $85K</a:t>
+            </a:r>
+          </a:p>
+          <a:p>
+            <a:pPr/>
+            <a:r>
+              <a:t>Total benefits: $755K</a:t>
+            </a:r>
+          </a:p>
+        </p:txBody>
+      </p:sp>
+      <p:sp>
+        <p:nvSpPr>
+          <p:cNvPr id="5" name="Text Placeholder 4"/>
+          <p:cNvSpPr>
+            <a:spLocks noGrp="1"/>
+          </p:cNvSpPr>
+          <p:nvPr>
+            <p:ph type="body" idx="15" sz="quarter"/>
           </p:nvPr>
         </p:nvSpPr>
         <p:spPr/>
         <p:txBody>
           <a:bodyPr/>
           <a:lstStyle/>
-          <a:p>
-            <a:pPr/>
-            <a:r>
-              <a:rPr b="1"/>
-              <a:t>Network Provisioning</a:t>
-            </a:r>
-            <a:r>
-              <a:t>: Automated VLAN, routing, and security policy deployment</a:t>
-            </a:r>
-          </a:p>
-          <a:p>
-            <a:pPr/>
-            <a:r>
-              <a:rPr b="1"/>
-              <a:t>Service Chaining</a:t>
-            </a:r>
-            <a:r>
-              <a:t>: Automated service function chaining with policy enforcement</a:t>
-            </a:r>
-          </a:p>
-          <a:p>
-            <a:pPr/>
-            <a:r>
-              <a:rPr b="1"/>
-              <a:t>Load Balancer Configuration</a:t>
-            </a:r>
-            <a:r>
-              <a:t>: Dynamic load balancer configuration through APIs</a:t>
-            </a:r>
-          </a:p>
-          <a:p>
-            <a:pPr/>
-            <a:r>
-              <a:rPr b="1"/>
-              <a:t>Security Policy</a:t>
-            </a:r>
-            <a:r>
-              <a:t>: Automated firewall and security group configuration</a:t>
-            </a:r>
-          </a:p>
-          <a:p>
-            <a:pPr/>
-            <a:r>
-              <a:rPr b="1"/>
-              <a:t>Monitoring Setup</a:t>
-            </a:r>
-            <a:r>
-              <a:t>: Automated network monitoring and alerting configuration</a:t>
-            </a:r>
-          </a:p>
-          <a:p>
-            <a:pPr/>
-            <a:r>
-              <a:rPr b="1"/>
-              <a:t>Application Teams</a:t>
-            </a:r>
-            <a:r>
-              <a:t>: 15 development teams now use automated network provisioning</a:t>
-            </a:r>
-          </a:p>
-          <a:p>
-            <a:pPr/>
-            <a:r>
-              <a:rPr b="1"/>
-              <a:t>Infrastructure Teams</a:t>
-            </a:r>
-            <a:r>
-              <a:t>: Network team productivity improved by 50%</a:t>
-            </a:r>
-          </a:p>
-          <a:p>
-            <a:pPr/>
-            <a:r>
-              <a:rPr b="1"/>
-              <a:t>Security Teams</a:t>
-            </a:r>
-            <a:r>
-              <a:t>: Automated security policy deployment and compliance checking</a:t>
-            </a:r>
-          </a:p>
-          <a:p>
-            <a:pPr/>
-            <a:r>
-              <a:rPr b="1"/>
-              <a:t>Operations Teams</a:t>
-            </a:r>
-            <a:r>
-              <a:t>: Unified operational dashboards for network and application health</a:t>
-            </a:r>
-          </a:p>
-          <a:p>
-            <a:pPr/>
-            <a:r>
-              <a:rPr b="1"/>
-              <a:t>Business Teams</a:t>
-            </a:r>
-            <a:r>
-              <a:t>: Faster time-to-market with automated infrastructure delivery</a:t>
-            </a:r>
-          </a:p>
+          <a:p/>
         </p:txBody>
       </p:sp>
     </p:spTree>
@@ -5239,7 +4126,19 @@
       <p:grpSpPr/>
       <p:sp>
         <p:nvSpPr>
-          <p:cNvPr id="2" name="Text Placeholder 1"/>
+          <p:cNvPr id="2" name="Picture Placeholder 1"/>
+          <p:cNvSpPr>
+            <a:spLocks noGrp="1"/>
+          </p:cNvSpPr>
+          <p:nvPr>
+            <p:ph type="pic" idx="13" sz="quarter"/>
+          </p:nvPr>
+        </p:nvSpPr>
+        <p:spPr/>
+      </p:sp>
+      <p:sp>
+        <p:nvSpPr>
+          <p:cNvPr id="3" name="Text Placeholder 2"/>
           <p:cNvSpPr>
             <a:spLocks noGrp="1"/>
           </p:cNvSpPr>
@@ -5254,35 +4153,103 @@
           <a:p>
             <a:pPr algn="l"/>
             <a:r>
-              <a:rPr b="1"/>
-              <a:t>Project Execution Timeline</a:t>
-            </a:r>
-          </a:p>
-        </p:txBody>
-      </p:sp>
-      <p:sp>
-        <p:nvSpPr>
-          <p:cNvPr id="3" name="Picture Placeholder 2"/>
-          <p:cNvSpPr>
-            <a:spLocks noGrp="1"/>
-          </p:cNvSpPr>
-          <p:nvPr>
-            <p:ph type="pic" idx="13" sz="quarter"/>
+              <a:t>Knowledge Transfer</a:t>
+            </a:r>
+          </a:p>
+        </p:txBody>
+      </p:sp>
+      <p:sp>
+        <p:nvSpPr>
+          <p:cNvPr id="4" name="Text Placeholder 3"/>
+          <p:cNvSpPr>
+            <a:spLocks noGrp="1"/>
+          </p:cNvSpPr>
+          <p:nvPr>
+            <p:ph type="body" idx="14" sz="quarter"/>
           </p:nvPr>
         </p:nvSpPr>
         <p:spPr/>
-      </p:sp>
-      <p:sp>
-        <p:nvSpPr>
-          <p:cNvPr id="4" name="Table Placeholder 3"/>
-          <p:cNvSpPr>
-            <a:spLocks noGrp="1"/>
-          </p:cNvSpPr>
-          <p:nvPr>
-            <p:ph type="tbl" idx="14" sz="quarter"/>
+        <p:txBody>
+          <a:bodyPr/>
+          <a:lstStyle/>
+          <a:p>
+            <a:pPr/>
+            <a:r>
+              <a:t>25 network engineers: 40 hrs</a:t>
+            </a:r>
+          </a:p>
+          <a:p>
+            <a:pPr/>
+            <a:r>
+              <a:t>20 DevOps engineers: 32 hrs</a:t>
+            </a:r>
+          </a:p>
+          <a:p>
+            <a:pPr/>
+            <a:r>
+              <a:t>60 developers: 16 hrs each</a:t>
+            </a:r>
+          </a:p>
+          <a:p>
+            <a:pPr/>
+            <a:r>
+              <a:t>30 operations staff: 24 hrs</a:t>
+            </a:r>
+          </a:p>
+          <a:p>
+            <a:pPr/>
+            <a:r>
+              <a:t>Total: 2,400 training hours</a:t>
+            </a:r>
+          </a:p>
+          <a:p>
+            <a:pPr/>
+            <a:r>
+              <a:t>Architecture design docs</a:t>
+            </a:r>
+          </a:p>
+          <a:p>
+            <a:pPr/>
+            <a:r>
+              <a:t>Operational runbook library</a:t>
+            </a:r>
+          </a:p>
+          <a:p>
+            <a:pPr/>
+            <a:r>
+              <a:t>API integration guides</a:t>
+            </a:r>
+          </a:p>
+          <a:p>
+            <a:pPr/>
+            <a:r>
+              <a:t>Ansible playbook catalog</a:t>
+            </a:r>
+          </a:p>
+          <a:p>
+            <a:pPr/>
+            <a:r>
+              <a:t>Troubleshooting procedures</a:t>
+            </a:r>
+          </a:p>
+        </p:txBody>
+      </p:sp>
+      <p:sp>
+        <p:nvSpPr>
+          <p:cNvPr id="5" name="Text Placeholder 4"/>
+          <p:cNvSpPr>
+            <a:spLocks noGrp="1"/>
+          </p:cNvSpPr>
+          <p:nvPr>
+            <p:ph type="body" idx="15" sz="quarter"/>
           </p:nvPr>
         </p:nvSpPr>
         <p:spPr/>
+        <p:txBody>
+          <a:bodyPr/>
+          <a:lstStyle/>
+          <a:p/>
+        </p:txBody>
       </p:sp>
     </p:spTree>
   </p:cSld>
@@ -5304,7 +4271,19 @@
       <p:grpSpPr/>
       <p:sp>
         <p:nvSpPr>
-          <p:cNvPr id="2" name="Text Placeholder 1"/>
+          <p:cNvPr id="2" name="Picture Placeholder 1"/>
+          <p:cNvSpPr>
+            <a:spLocks noGrp="1"/>
+          </p:cNvSpPr>
+          <p:nvPr>
+            <p:ph type="pic" idx="13" sz="quarter"/>
+          </p:nvPr>
+        </p:nvSpPr>
+        <p:spPr/>
+      </p:sp>
+      <p:sp>
+        <p:nvSpPr>
+          <p:cNvPr id="3" name="Text Placeholder 2"/>
           <p:cNvSpPr>
             <a:spLocks noGrp="1"/>
           </p:cNvSpPr>
@@ -5317,88 +4296,104 @@
           <a:bodyPr/>
           <a:lstStyle/>
           <a:p>
-            <a:r>
-              <a:t>Quality Assurance Results</a:t>
-            </a:r>
-          </a:p>
-        </p:txBody>
-      </p:sp>
-      <p:sp>
-        <p:nvSpPr>
-          <p:cNvPr id="3" name="Picture Placeholder 2"/>
-          <p:cNvSpPr>
-            <a:spLocks noGrp="1"/>
-          </p:cNvSpPr>
-          <p:nvPr>
-            <p:ph type="pic" idx="13" sz="quarter"/>
+            <a:pPr algn="l"/>
+            <a:r>
+              <a:t>Support Transition</a:t>
+            </a:r>
+          </a:p>
+        </p:txBody>
+      </p:sp>
+      <p:sp>
+        <p:nvSpPr>
+          <p:cNvPr id="4" name="Text Placeholder 3"/>
+          <p:cNvSpPr>
+            <a:spLocks noGrp="1"/>
+          </p:cNvSpPr>
+          <p:nvPr>
+            <p:ph type="body" idx="14" sz="quarter"/>
           </p:nvPr>
         </p:nvSpPr>
         <p:spPr/>
-      </p:sp>
-      <p:sp>
-        <p:nvSpPr>
-          <p:cNvPr id="4" name="Text Placeholder 3"/>
-          <p:cNvSpPr>
-            <a:spLocks noGrp="1"/>
-          </p:cNvSpPr>
-          <p:nvPr>
-            <p:ph type="body" idx="14" sz="quarter"/>
+        <p:txBody>
+          <a:bodyPr/>
+          <a:lstStyle/>
+          <a:p>
+            <a:pPr/>
+            <a:r>
+              <a:t>L1/L2 support team trained</a:t>
+            </a:r>
+          </a:p>
+          <a:p>
+            <a:pPr/>
+            <a:r>
+              <a:t>Escalation matrix documented</a:t>
+            </a:r>
+          </a:p>
+          <a:p>
+            <a:pPr/>
+            <a:r>
+              <a:t>SLA monitoring configured</a:t>
+            </a:r>
+          </a:p>
+          <a:p>
+            <a:pPr/>
+            <a:r>
+              <a:t>Incident procedures tested</a:t>
+            </a:r>
+          </a:p>
+          <a:p>
+            <a:pPr/>
+            <a:r>
+              <a:t>Vendor contacts established</a:t>
+            </a:r>
+          </a:p>
+          <a:p>
+            <a:pPr/>
+            <a:r>
+              <a:t>24/7 pipeline monitoring</a:t>
+            </a:r>
+          </a:p>
+          <a:p>
+            <a:pPr/>
+            <a:r>
+              <a:t>Daily health checks</a:t>
+            </a:r>
+          </a:p>
+          <a:p>
+            <a:pPr/>
+            <a:r>
+              <a:t>Weekly optimization reviews</a:t>
+            </a:r>
+          </a:p>
+          <a:p>
+            <a:pPr/>
+            <a:r>
+              <a:t>Monthly capacity planning</a:t>
+            </a:r>
+          </a:p>
+          <a:p>
+            <a:pPr/>
+            <a:r>
+              <a:t>Quarterly security audits</a:t>
+            </a:r>
+          </a:p>
+        </p:txBody>
+      </p:sp>
+      <p:sp>
+        <p:nvSpPr>
+          <p:cNvPr id="5" name="Text Placeholder 4"/>
+          <p:cNvSpPr>
+            <a:spLocks noGrp="1"/>
+          </p:cNvSpPr>
+          <p:nvPr>
+            <p:ph type="body" idx="15" sz="quarter"/>
           </p:nvPr>
         </p:nvSpPr>
         <p:spPr/>
         <p:txBody>
           <a:bodyPr/>
           <a:lstStyle/>
-          <a:p>
-            <a:pPr/>
-            <a:r>
-              <a:rPr b="1"/>
-              <a:t>Automation Testing</a:t>
-            </a:r>
-            <a:r>
-              <a:t>: 100% of network automation workflows tested and validated</a:t>
-            </a:r>
-          </a:p>
-          <a:p>
-            <a:pPr/>
-            <a:r>
-              <a:rPr b="1"/>
-              <a:t>Performance Testing</a:t>
-            </a:r>
-            <a:r>
-              <a:t>: Achieved 60% improvement in deployment time</a:t>
-            </a:r>
-          </a:p>
-          <a:p>
-            <a:pPr/>
-            <a:r>
-              <a:rPr b="1"/>
-              <a:t>Security Testing</a:t>
-            </a:r>
-            <a:r>
-              <a:t>: Zero critical vulnerabilities in automated network configurations</a:t>
-            </a:r>
-          </a:p>
-          <a:p>
-            <a:pPr/>
-            <a:r>
-              <a:rPr b="1"/>
-              <a:t>Integration Testing</a:t>
-            </a:r>
-            <a:r>
-              <a:t>: All 15 application teams successfully using automated provisioning</a:t>
-            </a:r>
-          </a:p>
-          <a:p>
-            <a:pPr/>
-            <a:r>
-              <a:rPr b="1"/>
-              <a:t>User Acceptance</a:t>
-            </a:r>
-            <a:r>
-              <a:t>: 94% satisfaction with automated network provisioning</a:t>
-            </a:r>
-          </a:p>
+          <a:p/>
         </p:txBody>
       </p:sp>
     </p:spTree>
@@ -5421,7 +4416,19 @@
       <p:grpSpPr/>
       <p:sp>
         <p:nvSpPr>
-          <p:cNvPr id="2" name="Text Placeholder 1"/>
+          <p:cNvPr id="2" name="Picture Placeholder 1"/>
+          <p:cNvSpPr>
+            <a:spLocks noGrp="1"/>
+          </p:cNvSpPr>
+          <p:nvPr>
+            <p:ph type="pic" idx="13" sz="quarter"/>
+          </p:nvPr>
+        </p:nvSpPr>
+        <p:spPr/>
+      </p:sp>
+      <p:sp>
+        <p:nvSpPr>
+          <p:cNvPr id="3" name="Text Placeholder 2"/>
           <p:cNvSpPr>
             <a:spLocks noGrp="1"/>
           </p:cNvSpPr>
@@ -5434,44 +4441,97 @@
           <a:bodyPr/>
           <a:lstStyle/>
           <a:p>
-            <a:r>
-              <a:t>Investment Summary</a:t>
-            </a:r>
-          </a:p>
-        </p:txBody>
-      </p:sp>
-      <p:sp>
-        <p:nvSpPr>
-          <p:cNvPr id="3" name="Picture Placeholder 2"/>
-          <p:cNvSpPr>
-            <a:spLocks noGrp="1"/>
-          </p:cNvSpPr>
-          <p:nvPr>
-            <p:ph type="pic" idx="14" sz="quarter"/>
+            <a:pPr algn="l"/>
+            <a:r>
+              <a:t>Future Enhancements</a:t>
+            </a:r>
+          </a:p>
+        </p:txBody>
+      </p:sp>
+      <p:sp>
+        <p:nvSpPr>
+          <p:cNvPr id="4" name="Text Placeholder 3"/>
+          <p:cNvSpPr>
+            <a:spLocks noGrp="1"/>
+          </p:cNvSpPr>
+          <p:nvPr>
+            <p:ph type="body" idx="14" sz="quarter"/>
           </p:nvPr>
         </p:nvSpPr>
         <p:spPr/>
-      </p:sp>
-      <p:sp>
-        <p:nvSpPr>
-          <p:cNvPr id="4" name="Chart Placeholder 3"/>
-          <p:cNvSpPr>
-            <a:spLocks noGrp="1"/>
-          </p:cNvSpPr>
-          <p:nvPr>
-            <p:ph type="chart" idx="15" sz="quarter"/>
-          </p:nvPr>
-        </p:nvSpPr>
-        <p:spPr/>
-      </p:sp>
-      <p:sp>
-        <p:nvSpPr>
-          <p:cNvPr id="5" name="Content Placeholder 4"/>
-          <p:cNvSpPr>
-            <a:spLocks noGrp="1"/>
-          </p:cNvSpPr>
-          <p:nvPr>
-            <p:ph idx="16" sz="quarter"/>
+        <p:txBody>
+          <a:bodyPr/>
+          <a:lstStyle/>
+          <a:p>
+            <a:pPr/>
+            <a:r>
+              <a:t>Enable AI-driven optimization</a:t>
+            </a:r>
+          </a:p>
+          <a:p>
+            <a:pPr/>
+            <a:r>
+              <a:t>Expand multi-cloud networking</a:t>
+            </a:r>
+          </a:p>
+          <a:p>
+            <a:pPr/>
+            <a:r>
+              <a:t>Implement intent-based policies</a:t>
+            </a:r>
+          </a:p>
+          <a:p>
+            <a:pPr/>
+            <a:r>
+              <a:t>Add SD-WAN automation</a:t>
+            </a:r>
+          </a:p>
+          <a:p>
+            <a:pPr/>
+            <a:r>
+              <a:t>Integrate ServiceNow CMDB</a:t>
+            </a:r>
+          </a:p>
+          <a:p>
+            <a:pPr/>
+            <a:r>
+              <a:t>Deploy advanced analytics</a:t>
+            </a:r>
+          </a:p>
+          <a:p>
+            <a:pPr/>
+            <a:r>
+              <a:t>Implement GitOps workflows</a:t>
+            </a:r>
+          </a:p>
+          <a:p>
+            <a:pPr/>
+            <a:r>
+              <a:t>Enable edge automation</a:t>
+            </a:r>
+          </a:p>
+          <a:p>
+            <a:pPr/>
+            <a:r>
+              <a:t>Add zero-trust networking</a:t>
+            </a:r>
+          </a:p>
+          <a:p>
+            <a:pPr/>
+            <a:r>
+              <a:t>Expand self-service portal</a:t>
+            </a:r>
+          </a:p>
+        </p:txBody>
+      </p:sp>
+      <p:sp>
+        <p:nvSpPr>
+          <p:cNvPr id="5" name="Text Placeholder 4"/>
+          <p:cNvSpPr>
+            <a:spLocks noGrp="1"/>
+          </p:cNvSpPr>
+          <p:nvPr>
+            <p:ph type="body" idx="15" sz="quarter"/>
           </p:nvPr>
         </p:nvSpPr>
         <p:spPr/>

</xml_diff>